<commit_message>
added support for Video with GPT4 VISION Enhancement
</commit_message>
<xml_diff>
--- a/DocAI-Architecture.pptx
+++ b/DocAI-Architecture.pptx
@@ -124,7 +124,7 @@
 <file path=ppt/revisionInfo.xml><?xml version="1.0" encoding="utf-8"?>
 <p1510:revInfo xmlns:a="http://schemas.openxmlformats.org/drawingml/2006/main" xmlns:r="http://schemas.openxmlformats.org/officeDocument/2006/relationships" xmlns:p1510="http://schemas.microsoft.com/office/powerpoint/2015/10/main">
   <p1510:revLst>
-    <p1510:client id="{F9D43E7F-1D27-45AD-A9EF-7BAB61DCB54E}" v="102" dt="2024-01-16T17:56:24.070"/>
+    <p1510:client id="{F9D43E7F-1D27-45AD-A9EF-7BAB61DCB54E}" v="108" dt="2024-01-23T21:26:18.416"/>
   </p1510:revLst>
 </p1510:revInfo>
 </file>
@@ -134,7 +134,7 @@
   <pc:docChgLst>
     <pc:chgData name="Tirthankar Barari (TR)" userId="e41d4ef3-c9c5-4f08-a494-4c3cb9d953aa" providerId="ADAL" clId="{F9D43E7F-1D27-45AD-A9EF-7BAB61DCB54E}"/>
     <pc:docChg chg="undo redo custSel addSld delSld modSld sldOrd">
-      <pc:chgData name="Tirthankar Barari (TR)" userId="e41d4ef3-c9c5-4f08-a494-4c3cb9d953aa" providerId="ADAL" clId="{F9D43E7F-1D27-45AD-A9EF-7BAB61DCB54E}" dt="2024-01-16T18:10:31.526" v="4906" actId="20577"/>
+      <pc:chgData name="Tirthankar Barari (TR)" userId="e41d4ef3-c9c5-4f08-a494-4c3cb9d953aa" providerId="ADAL" clId="{F9D43E7F-1D27-45AD-A9EF-7BAB61DCB54E}" dt="2024-01-23T21:28:17.327" v="5096" actId="14100"/>
       <pc:docMkLst>
         <pc:docMk/>
       </pc:docMkLst>
@@ -6032,7 +6032,7 @@
         </pc:spChg>
       </pc:sldChg>
       <pc:sldChg chg="addSp delSp modSp new mod setBg">
-        <pc:chgData name="Tirthankar Barari (TR)" userId="e41d4ef3-c9c5-4f08-a494-4c3cb9d953aa" providerId="ADAL" clId="{F9D43E7F-1D27-45AD-A9EF-7BAB61DCB54E}" dt="2024-01-10T13:08:59.650" v="2480" actId="1076"/>
+        <pc:chgData name="Tirthankar Barari (TR)" userId="e41d4ef3-c9c5-4f08-a494-4c3cb9d953aa" providerId="ADAL" clId="{F9D43E7F-1D27-45AD-A9EF-7BAB61DCB54E}" dt="2024-01-22T22:31:40.767" v="4910" actId="1076"/>
         <pc:sldMkLst>
           <pc:docMk/>
           <pc:sldMk cId="598376428" sldId="259"/>
@@ -6078,7 +6078,7 @@
           </ac:picMkLst>
         </pc:picChg>
         <pc:picChg chg="add mod">
-          <ac:chgData name="Tirthankar Barari (TR)" userId="e41d4ef3-c9c5-4f08-a494-4c3cb9d953aa" providerId="ADAL" clId="{F9D43E7F-1D27-45AD-A9EF-7BAB61DCB54E}" dt="2024-01-10T13:08:00.182" v="2478" actId="1076"/>
+          <ac:chgData name="Tirthankar Barari (TR)" userId="e41d4ef3-c9c5-4f08-a494-4c3cb9d953aa" providerId="ADAL" clId="{F9D43E7F-1D27-45AD-A9EF-7BAB61DCB54E}" dt="2024-01-22T22:31:40.767" v="4910" actId="1076"/>
           <ac:picMkLst>
             <pc:docMk/>
             <pc:sldMk cId="598376428" sldId="259"/>
@@ -6142,7 +6142,7 @@
         </pc:picChg>
       </pc:sldChg>
       <pc:sldChg chg="addSp delSp modSp new add del mod ord modNotesTx">
-        <pc:chgData name="Tirthankar Barari (TR)" userId="e41d4ef3-c9c5-4f08-a494-4c3cb9d953aa" providerId="ADAL" clId="{F9D43E7F-1D27-45AD-A9EF-7BAB61DCB54E}" dt="2024-01-16T03:11:49.349" v="4665" actId="20577"/>
+        <pc:chgData name="Tirthankar Barari (TR)" userId="e41d4ef3-c9c5-4f08-a494-4c3cb9d953aa" providerId="ADAL" clId="{F9D43E7F-1D27-45AD-A9EF-7BAB61DCB54E}" dt="2024-01-23T21:28:17.327" v="5096" actId="14100"/>
         <pc:sldMkLst>
           <pc:docMk/>
           <pc:sldMk cId="894813367" sldId="261"/>
@@ -6308,7 +6308,7 @@
           </ac:spMkLst>
         </pc:spChg>
         <pc:spChg chg="add del mod topLvl">
-          <ac:chgData name="Tirthankar Barari (TR)" userId="e41d4ef3-c9c5-4f08-a494-4c3cb9d953aa" providerId="ADAL" clId="{F9D43E7F-1D27-45AD-A9EF-7BAB61DCB54E}" dt="2024-01-15T14:36:27.787" v="4061" actId="165"/>
+          <ac:chgData name="Tirthankar Barari (TR)" userId="e41d4ef3-c9c5-4f08-a494-4c3cb9d953aa" providerId="ADAL" clId="{F9D43E7F-1D27-45AD-A9EF-7BAB61DCB54E}" dt="2024-01-23T21:04:19.398" v="4981" actId="1076"/>
           <ac:spMkLst>
             <pc:docMk/>
             <pc:sldMk cId="894813367" sldId="261"/>
@@ -6316,7 +6316,7 @@
           </ac:spMkLst>
         </pc:spChg>
         <pc:spChg chg="add mod topLvl">
-          <ac:chgData name="Tirthankar Barari (TR)" userId="e41d4ef3-c9c5-4f08-a494-4c3cb9d953aa" providerId="ADAL" clId="{F9D43E7F-1D27-45AD-A9EF-7BAB61DCB54E}" dt="2024-01-15T14:36:27.787" v="4061" actId="165"/>
+          <ac:chgData name="Tirthankar Barari (TR)" userId="e41d4ef3-c9c5-4f08-a494-4c3cb9d953aa" providerId="ADAL" clId="{F9D43E7F-1D27-45AD-A9EF-7BAB61DCB54E}" dt="2024-01-23T21:04:19.398" v="4981" actId="1076"/>
           <ac:spMkLst>
             <pc:docMk/>
             <pc:sldMk cId="894813367" sldId="261"/>
@@ -6324,7 +6324,7 @@
           </ac:spMkLst>
         </pc:spChg>
         <pc:spChg chg="add mod topLvl">
-          <ac:chgData name="Tirthankar Barari (TR)" userId="e41d4ef3-c9c5-4f08-a494-4c3cb9d953aa" providerId="ADAL" clId="{F9D43E7F-1D27-45AD-A9EF-7BAB61DCB54E}" dt="2024-01-15T14:36:27.787" v="4061" actId="165"/>
+          <ac:chgData name="Tirthankar Barari (TR)" userId="e41d4ef3-c9c5-4f08-a494-4c3cb9d953aa" providerId="ADAL" clId="{F9D43E7F-1D27-45AD-A9EF-7BAB61DCB54E}" dt="2024-01-23T21:04:19.398" v="4981" actId="1076"/>
           <ac:spMkLst>
             <pc:docMk/>
             <pc:sldMk cId="894813367" sldId="261"/>
@@ -6332,7 +6332,7 @@
           </ac:spMkLst>
         </pc:spChg>
         <pc:spChg chg="add mod topLvl">
-          <ac:chgData name="Tirthankar Barari (TR)" userId="e41d4ef3-c9c5-4f08-a494-4c3cb9d953aa" providerId="ADAL" clId="{F9D43E7F-1D27-45AD-A9EF-7BAB61DCB54E}" dt="2024-01-15T14:36:27.787" v="4061" actId="165"/>
+          <ac:chgData name="Tirthankar Barari (TR)" userId="e41d4ef3-c9c5-4f08-a494-4c3cb9d953aa" providerId="ADAL" clId="{F9D43E7F-1D27-45AD-A9EF-7BAB61DCB54E}" dt="2024-01-23T21:04:19.398" v="4981" actId="1076"/>
           <ac:spMkLst>
             <pc:docMk/>
             <pc:sldMk cId="894813367" sldId="261"/>
@@ -6356,7 +6356,7 @@
           </ac:spMkLst>
         </pc:spChg>
         <pc:spChg chg="add mod topLvl">
-          <ac:chgData name="Tirthankar Barari (TR)" userId="e41d4ef3-c9c5-4f08-a494-4c3cb9d953aa" providerId="ADAL" clId="{F9D43E7F-1D27-45AD-A9EF-7BAB61DCB54E}" dt="2024-01-15T14:36:27.787" v="4061" actId="165"/>
+          <ac:chgData name="Tirthankar Barari (TR)" userId="e41d4ef3-c9c5-4f08-a494-4c3cb9d953aa" providerId="ADAL" clId="{F9D43E7F-1D27-45AD-A9EF-7BAB61DCB54E}" dt="2024-01-23T21:04:19.398" v="4981" actId="1076"/>
           <ac:spMkLst>
             <pc:docMk/>
             <pc:sldMk cId="894813367" sldId="261"/>
@@ -6364,7 +6364,7 @@
           </ac:spMkLst>
         </pc:spChg>
         <pc:spChg chg="add mod topLvl">
-          <ac:chgData name="Tirthankar Barari (TR)" userId="e41d4ef3-c9c5-4f08-a494-4c3cb9d953aa" providerId="ADAL" clId="{F9D43E7F-1D27-45AD-A9EF-7BAB61DCB54E}" dt="2024-01-15T14:36:27.787" v="4061" actId="165"/>
+          <ac:chgData name="Tirthankar Barari (TR)" userId="e41d4ef3-c9c5-4f08-a494-4c3cb9d953aa" providerId="ADAL" clId="{F9D43E7F-1D27-45AD-A9EF-7BAB61DCB54E}" dt="2024-01-23T21:04:19.398" v="4981" actId="1076"/>
           <ac:spMkLst>
             <pc:docMk/>
             <pc:sldMk cId="894813367" sldId="261"/>
@@ -6412,13 +6412,69 @@
           </ac:spMkLst>
         </pc:spChg>
         <pc:spChg chg="add mod topLvl">
-          <ac:chgData name="Tirthankar Barari (TR)" userId="e41d4ef3-c9c5-4f08-a494-4c3cb9d953aa" providerId="ADAL" clId="{F9D43E7F-1D27-45AD-A9EF-7BAB61DCB54E}" dt="2024-01-15T14:36:27.787" v="4061" actId="165"/>
+          <ac:chgData name="Tirthankar Barari (TR)" userId="e41d4ef3-c9c5-4f08-a494-4c3cb9d953aa" providerId="ADAL" clId="{F9D43E7F-1D27-45AD-A9EF-7BAB61DCB54E}" dt="2024-01-23T21:27:22.969" v="5095" actId="1076"/>
           <ac:spMkLst>
             <pc:docMk/>
             <pc:sldMk cId="894813367" sldId="261"/>
             <ac:spMk id="35" creationId="{639700A1-C78B-F9F5-0207-66871A0B0F29}"/>
           </ac:spMkLst>
         </pc:spChg>
+        <pc:spChg chg="add del mod">
+          <ac:chgData name="Tirthankar Barari (TR)" userId="e41d4ef3-c9c5-4f08-a494-4c3cb9d953aa" providerId="ADAL" clId="{F9D43E7F-1D27-45AD-A9EF-7BAB61DCB54E}" dt="2024-01-23T21:19:59.728" v="5012"/>
+          <ac:spMkLst>
+            <pc:docMk/>
+            <pc:sldMk cId="894813367" sldId="261"/>
+            <ac:spMk id="39" creationId="{2BDA3DC6-3903-1D53-5444-301480ECAE5A}"/>
+          </ac:spMkLst>
+        </pc:spChg>
+        <pc:spChg chg="add mod">
+          <ac:chgData name="Tirthankar Barari (TR)" userId="e41d4ef3-c9c5-4f08-a494-4c3cb9d953aa" providerId="ADAL" clId="{F9D43E7F-1D27-45AD-A9EF-7BAB61DCB54E}" dt="2024-01-23T21:24:18.916" v="5055" actId="555"/>
+          <ac:spMkLst>
+            <pc:docMk/>
+            <pc:sldMk cId="894813367" sldId="261"/>
+            <ac:spMk id="40" creationId="{6838A613-FC02-3FB4-BA30-CB3EF9FA9E00}"/>
+          </ac:spMkLst>
+        </pc:spChg>
+        <pc:spChg chg="add mod">
+          <ac:chgData name="Tirthankar Barari (TR)" userId="e41d4ef3-c9c5-4f08-a494-4c3cb9d953aa" providerId="ADAL" clId="{F9D43E7F-1D27-45AD-A9EF-7BAB61DCB54E}" dt="2024-01-23T21:24:18.916" v="5055" actId="555"/>
+          <ac:spMkLst>
+            <pc:docMk/>
+            <pc:sldMk cId="894813367" sldId="261"/>
+            <ac:spMk id="41" creationId="{3ECC6192-D7CF-6DDD-F8D5-C424A64B20AB}"/>
+          </ac:spMkLst>
+        </pc:spChg>
+        <pc:spChg chg="add mod">
+          <ac:chgData name="Tirthankar Barari (TR)" userId="e41d4ef3-c9c5-4f08-a494-4c3cb9d953aa" providerId="ADAL" clId="{F9D43E7F-1D27-45AD-A9EF-7BAB61DCB54E}" dt="2024-01-23T21:25:39.452" v="5074" actId="555"/>
+          <ac:spMkLst>
+            <pc:docMk/>
+            <pc:sldMk cId="894813367" sldId="261"/>
+            <ac:spMk id="42" creationId="{1ABA0F5A-8158-07F1-76EE-BDD6D054BB21}"/>
+          </ac:spMkLst>
+        </pc:spChg>
+        <pc:spChg chg="add mod">
+          <ac:chgData name="Tirthankar Barari (TR)" userId="e41d4ef3-c9c5-4f08-a494-4c3cb9d953aa" providerId="ADAL" clId="{F9D43E7F-1D27-45AD-A9EF-7BAB61DCB54E}" dt="2024-01-23T21:25:39.452" v="5074" actId="555"/>
+          <ac:spMkLst>
+            <pc:docMk/>
+            <pc:sldMk cId="894813367" sldId="261"/>
+            <ac:spMk id="43" creationId="{B467F503-5AF4-97F7-BFA0-DDCE9E71767C}"/>
+          </ac:spMkLst>
+        </pc:spChg>
+        <pc:spChg chg="add mod">
+          <ac:chgData name="Tirthankar Barari (TR)" userId="e41d4ef3-c9c5-4f08-a494-4c3cb9d953aa" providerId="ADAL" clId="{F9D43E7F-1D27-45AD-A9EF-7BAB61DCB54E}" dt="2024-01-23T21:27:09.216" v="5094" actId="555"/>
+          <ac:spMkLst>
+            <pc:docMk/>
+            <pc:sldMk cId="894813367" sldId="261"/>
+            <ac:spMk id="44" creationId="{764D6A06-4212-74F1-C5C8-1269E3684F55}"/>
+          </ac:spMkLst>
+        </pc:spChg>
+        <pc:spChg chg="add mod">
+          <ac:chgData name="Tirthankar Barari (TR)" userId="e41d4ef3-c9c5-4f08-a494-4c3cb9d953aa" providerId="ADAL" clId="{F9D43E7F-1D27-45AD-A9EF-7BAB61DCB54E}" dt="2024-01-23T21:27:09.216" v="5094" actId="555"/>
+          <ac:spMkLst>
+            <pc:docMk/>
+            <pc:sldMk cId="894813367" sldId="261"/>
+            <ac:spMk id="45" creationId="{AE9E709C-5FDC-3D8E-48B7-3A9710C33A80}"/>
+          </ac:spMkLst>
+        </pc:spChg>
         <pc:spChg chg="add mod">
           <ac:chgData name="Tirthankar Barari (TR)" userId="e41d4ef3-c9c5-4f08-a494-4c3cb9d953aa" providerId="ADAL" clId="{F9D43E7F-1D27-45AD-A9EF-7BAB61DCB54E}" dt="2024-01-15T01:33:08.736" v="3523" actId="208"/>
           <ac:spMkLst>
@@ -6676,7 +6732,7 @@
           </ac:spMkLst>
         </pc:spChg>
         <pc:grpChg chg="add mod ord topLvl">
-          <ac:chgData name="Tirthankar Barari (TR)" userId="e41d4ef3-c9c5-4f08-a494-4c3cb9d953aa" providerId="ADAL" clId="{F9D43E7F-1D27-45AD-A9EF-7BAB61DCB54E}" dt="2024-01-15T14:36:27.787" v="4061" actId="165"/>
+          <ac:chgData name="Tirthankar Barari (TR)" userId="e41d4ef3-c9c5-4f08-a494-4c3cb9d953aa" providerId="ADAL" clId="{F9D43E7F-1D27-45AD-A9EF-7BAB61DCB54E}" dt="2024-01-23T21:04:23.637" v="4982" actId="1076"/>
           <ac:grpSpMkLst>
             <pc:docMk/>
             <pc:sldMk cId="894813367" sldId="261"/>
@@ -6723,8 +6779,8 @@
             <ac:grpSpMk id="85" creationId="{8F289110-CC33-0945-91C1-41456E5C59BB}"/>
           </ac:grpSpMkLst>
         </pc:grpChg>
-        <pc:grpChg chg="add mod">
-          <ac:chgData name="Tirthankar Barari (TR)" userId="e41d4ef3-c9c5-4f08-a494-4c3cb9d953aa" providerId="ADAL" clId="{F9D43E7F-1D27-45AD-A9EF-7BAB61DCB54E}" dt="2024-01-16T02:52:04.926" v="4446" actId="1076"/>
+        <pc:grpChg chg="add del mod">
+          <ac:chgData name="Tirthankar Barari (TR)" userId="e41d4ef3-c9c5-4f08-a494-4c3cb9d953aa" providerId="ADAL" clId="{F9D43E7F-1D27-45AD-A9EF-7BAB61DCB54E}" dt="2024-01-23T20:04:57.495" v="4911" actId="165"/>
           <ac:grpSpMkLst>
             <pc:docMk/>
             <pc:sldMk cId="894813367" sldId="261"/>
@@ -6764,11 +6820,83 @@
           </ac:picMkLst>
         </pc:picChg>
         <pc:picChg chg="add del mod">
+          <ac:chgData name="Tirthankar Barari (TR)" userId="e41d4ef3-c9c5-4f08-a494-4c3cb9d953aa" providerId="ADAL" clId="{F9D43E7F-1D27-45AD-A9EF-7BAB61DCB54E}" dt="2024-01-23T20:52:41.097" v="4927" actId="478"/>
+          <ac:picMkLst>
+            <pc:docMk/>
+            <pc:sldMk cId="894813367" sldId="261"/>
+            <ac:picMk id="3" creationId="{ECEECC1A-558A-783E-6121-FC813D000FFE}"/>
+          </ac:picMkLst>
+        </pc:picChg>
+        <pc:picChg chg="add del mod">
+          <ac:chgData name="Tirthankar Barari (TR)" userId="e41d4ef3-c9c5-4f08-a494-4c3cb9d953aa" providerId="ADAL" clId="{F9D43E7F-1D27-45AD-A9EF-7BAB61DCB54E}" dt="2024-01-23T21:06:46.572" v="4984" actId="478"/>
+          <ac:picMkLst>
+            <pc:docMk/>
+            <pc:sldMk cId="894813367" sldId="261"/>
+            <ac:picMk id="5" creationId="{ED5538C6-8503-37B4-137A-BE8828639812}"/>
+          </ac:picMkLst>
+        </pc:picChg>
+        <pc:picChg chg="add del mod">
+          <ac:chgData name="Tirthankar Barari (TR)" userId="e41d4ef3-c9c5-4f08-a494-4c3cb9d953aa" providerId="ADAL" clId="{F9D43E7F-1D27-45AD-A9EF-7BAB61DCB54E}" dt="2024-01-23T21:06:45.637" v="4983" actId="478"/>
+          <ac:picMkLst>
+            <pc:docMk/>
+            <pc:sldMk cId="894813367" sldId="261"/>
+            <ac:picMk id="10" creationId="{6D9D62EE-2BCB-B7F2-94B8-84842020803C}"/>
+          </ac:picMkLst>
+        </pc:picChg>
+        <pc:picChg chg="add mod modCrop">
+          <ac:chgData name="Tirthankar Barari (TR)" userId="e41d4ef3-c9c5-4f08-a494-4c3cb9d953aa" providerId="ADAL" clId="{F9D43E7F-1D27-45AD-A9EF-7BAB61DCB54E}" dt="2024-01-23T21:23:49.284" v="5053" actId="14100"/>
+          <ac:picMkLst>
+            <pc:docMk/>
+            <pc:sldMk cId="894813367" sldId="261"/>
+            <ac:picMk id="16" creationId="{663EA680-3407-FBDE-1D17-EFA90FF40552}"/>
+          </ac:picMkLst>
+        </pc:picChg>
+        <pc:picChg chg="add del mod">
           <ac:chgData name="Tirthankar Barari (TR)" userId="e41d4ef3-c9c5-4f08-a494-4c3cb9d953aa" providerId="ADAL" clId="{F9D43E7F-1D27-45AD-A9EF-7BAB61DCB54E}" dt="2024-01-15T00:37:44.133" v="3286" actId="478"/>
           <ac:picMkLst>
             <pc:docMk/>
             <pc:sldMk cId="894813367" sldId="261"/>
             <ac:picMk id="26" creationId="{12E20EDA-3062-7690-F234-70A7512A8781}"/>
+          </ac:picMkLst>
+        </pc:picChg>
+        <pc:picChg chg="add mod modCrop">
+          <ac:chgData name="Tirthankar Barari (TR)" userId="e41d4ef3-c9c5-4f08-a494-4c3cb9d953aa" providerId="ADAL" clId="{F9D43E7F-1D27-45AD-A9EF-7BAB61DCB54E}" dt="2024-01-23T21:26:09.309" v="5076" actId="732"/>
+          <ac:picMkLst>
+            <pc:docMk/>
+            <pc:sldMk cId="894813367" sldId="261"/>
+            <ac:picMk id="28" creationId="{27D2B49A-EB10-CA9E-4FE8-ED85BCD4FD72}"/>
+          </ac:picMkLst>
+        </pc:picChg>
+        <pc:picChg chg="add mod modCrop">
+          <ac:chgData name="Tirthankar Barari (TR)" userId="e41d4ef3-c9c5-4f08-a494-4c3cb9d953aa" providerId="ADAL" clId="{F9D43E7F-1D27-45AD-A9EF-7BAB61DCB54E}" dt="2024-01-23T21:24:00.013" v="5054" actId="1076"/>
+          <ac:picMkLst>
+            <pc:docMk/>
+            <pc:sldMk cId="894813367" sldId="261"/>
+            <ac:picMk id="31" creationId="{7A505E37-E478-441B-428D-A9F948994094}"/>
+          </ac:picMkLst>
+        </pc:picChg>
+        <pc:picChg chg="add mod modCrop">
+          <ac:chgData name="Tirthankar Barari (TR)" userId="e41d4ef3-c9c5-4f08-a494-4c3cb9d953aa" providerId="ADAL" clId="{F9D43E7F-1D27-45AD-A9EF-7BAB61DCB54E}" dt="2024-01-23T21:26:00.111" v="5075" actId="732"/>
+          <ac:picMkLst>
+            <pc:docMk/>
+            <pc:sldMk cId="894813367" sldId="261"/>
+            <ac:picMk id="33" creationId="{932AD993-2A8B-2A3A-1449-672DF98574C1}"/>
+          </ac:picMkLst>
+        </pc:picChg>
+        <pc:picChg chg="add mod">
+          <ac:chgData name="Tirthankar Barari (TR)" userId="e41d4ef3-c9c5-4f08-a494-4c3cb9d953aa" providerId="ADAL" clId="{F9D43E7F-1D27-45AD-A9EF-7BAB61DCB54E}" dt="2024-01-23T21:16:37.215" v="4996" actId="1076"/>
+          <ac:picMkLst>
+            <pc:docMk/>
+            <pc:sldMk cId="894813367" sldId="261"/>
+            <ac:picMk id="36" creationId="{35A356D3-B654-E3D5-26E1-F376A0A6D7CB}"/>
+          </ac:picMkLst>
+        </pc:picChg>
+        <pc:picChg chg="add mod">
+          <ac:chgData name="Tirthankar Barari (TR)" userId="e41d4ef3-c9c5-4f08-a494-4c3cb9d953aa" providerId="ADAL" clId="{F9D43E7F-1D27-45AD-A9EF-7BAB61DCB54E}" dt="2024-01-23T21:18:51.981" v="5000" actId="1076"/>
+          <ac:picMkLst>
+            <pc:docMk/>
+            <pc:sldMk cId="894813367" sldId="261"/>
+            <ac:picMk id="38" creationId="{AC074975-7A02-D62C-4967-695DB5A51BC5}"/>
           </ac:picMkLst>
         </pc:picChg>
         <pc:picChg chg="add del mod">
@@ -6780,7 +6908,7 @@
           </ac:picMkLst>
         </pc:picChg>
         <pc:picChg chg="add mod">
-          <ac:chgData name="Tirthankar Barari (TR)" userId="e41d4ef3-c9c5-4f08-a494-4c3cb9d953aa" providerId="ADAL" clId="{F9D43E7F-1D27-45AD-A9EF-7BAB61DCB54E}" dt="2024-01-15T01:32:19.019" v="3517" actId="1076"/>
+          <ac:chgData name="Tirthankar Barari (TR)" userId="e41d4ef3-c9c5-4f08-a494-4c3cb9d953aa" providerId="ADAL" clId="{F9D43E7F-1D27-45AD-A9EF-7BAB61DCB54E}" dt="2024-01-23T20:05:45.735" v="4914" actId="1076"/>
           <ac:picMkLst>
             <pc:docMk/>
             <pc:sldMk cId="894813367" sldId="261"/>
@@ -6812,7 +6940,7 @@
           </ac:cxnSpMkLst>
         </pc:cxnChg>
         <pc:cxnChg chg="add mod topLvl">
-          <ac:chgData name="Tirthankar Barari (TR)" userId="e41d4ef3-c9c5-4f08-a494-4c3cb9d953aa" providerId="ADAL" clId="{F9D43E7F-1D27-45AD-A9EF-7BAB61DCB54E}" dt="2024-01-15T14:36:27.787" v="4061" actId="165"/>
+          <ac:chgData name="Tirthankar Barari (TR)" userId="e41d4ef3-c9c5-4f08-a494-4c3cb9d953aa" providerId="ADAL" clId="{F9D43E7F-1D27-45AD-A9EF-7BAB61DCB54E}" dt="2024-01-23T21:28:17.327" v="5096" actId="14100"/>
           <ac:cxnSpMkLst>
             <pc:docMk/>
             <pc:sldMk cId="894813367" sldId="261"/>
@@ -7018,7 +7146,7 @@
           <a:p>
             <a:fld id="{2597F8CA-C0D6-46E1-BE92-BE44C33ECD60}" type="datetimeFigureOut">
               <a:rPr lang="en-US" smtClean="0"/>
-              <a:t>1/16/2024</a:t>
+              <a:t>1/23/2024</a:t>
             </a:fld>
             <a:endParaRPr lang="en-US"/>
           </a:p>
@@ -8239,7 +8367,7 @@
           <a:p>
             <a:fld id="{46A9F2F8-7B6D-46B7-8E68-D723B59E620F}" type="datetimeFigureOut">
               <a:rPr lang="en-US" smtClean="0"/>
-              <a:t>1/16/2024</a:t>
+              <a:t>1/23/2024</a:t>
             </a:fld>
             <a:endParaRPr lang="en-US"/>
           </a:p>
@@ -8437,7 +8565,7 @@
           <a:p>
             <a:fld id="{46A9F2F8-7B6D-46B7-8E68-D723B59E620F}" type="datetimeFigureOut">
               <a:rPr lang="en-US" smtClean="0"/>
-              <a:t>1/16/2024</a:t>
+              <a:t>1/23/2024</a:t>
             </a:fld>
             <a:endParaRPr lang="en-US"/>
           </a:p>
@@ -8645,7 +8773,7 @@
           <a:p>
             <a:fld id="{46A9F2F8-7B6D-46B7-8E68-D723B59E620F}" type="datetimeFigureOut">
               <a:rPr lang="en-US" smtClean="0"/>
-              <a:t>1/16/2024</a:t>
+              <a:t>1/23/2024</a:t>
             </a:fld>
             <a:endParaRPr lang="en-US"/>
           </a:p>
@@ -8843,7 +8971,7 @@
           <a:p>
             <a:fld id="{46A9F2F8-7B6D-46B7-8E68-D723B59E620F}" type="datetimeFigureOut">
               <a:rPr lang="en-US" smtClean="0"/>
-              <a:t>1/16/2024</a:t>
+              <a:t>1/23/2024</a:t>
             </a:fld>
             <a:endParaRPr lang="en-US"/>
           </a:p>
@@ -9118,7 +9246,7 @@
           <a:p>
             <a:fld id="{46A9F2F8-7B6D-46B7-8E68-D723B59E620F}" type="datetimeFigureOut">
               <a:rPr lang="en-US" smtClean="0"/>
-              <a:t>1/16/2024</a:t>
+              <a:t>1/23/2024</a:t>
             </a:fld>
             <a:endParaRPr lang="en-US"/>
           </a:p>
@@ -9383,7 +9511,7 @@
           <a:p>
             <a:fld id="{46A9F2F8-7B6D-46B7-8E68-D723B59E620F}" type="datetimeFigureOut">
               <a:rPr lang="en-US" smtClean="0"/>
-              <a:t>1/16/2024</a:t>
+              <a:t>1/23/2024</a:t>
             </a:fld>
             <a:endParaRPr lang="en-US"/>
           </a:p>
@@ -9795,7 +9923,7 @@
           <a:p>
             <a:fld id="{46A9F2F8-7B6D-46B7-8E68-D723B59E620F}" type="datetimeFigureOut">
               <a:rPr lang="en-US" smtClean="0"/>
-              <a:t>1/16/2024</a:t>
+              <a:t>1/23/2024</a:t>
             </a:fld>
             <a:endParaRPr lang="en-US"/>
           </a:p>
@@ -9936,7 +10064,7 @@
           <a:p>
             <a:fld id="{46A9F2F8-7B6D-46B7-8E68-D723B59E620F}" type="datetimeFigureOut">
               <a:rPr lang="en-US" smtClean="0"/>
-              <a:t>1/16/2024</a:t>
+              <a:t>1/23/2024</a:t>
             </a:fld>
             <a:endParaRPr lang="en-US"/>
           </a:p>
@@ -10049,7 +10177,7 @@
           <a:p>
             <a:fld id="{46A9F2F8-7B6D-46B7-8E68-D723B59E620F}" type="datetimeFigureOut">
               <a:rPr lang="en-US" smtClean="0"/>
-              <a:t>1/16/2024</a:t>
+              <a:t>1/23/2024</a:t>
             </a:fld>
             <a:endParaRPr lang="en-US"/>
           </a:p>
@@ -10360,7 +10488,7 @@
           <a:p>
             <a:fld id="{46A9F2F8-7B6D-46B7-8E68-D723B59E620F}" type="datetimeFigureOut">
               <a:rPr lang="en-US" smtClean="0"/>
-              <a:t>1/16/2024</a:t>
+              <a:t>1/23/2024</a:t>
             </a:fld>
             <a:endParaRPr lang="en-US"/>
           </a:p>
@@ -10648,7 +10776,7 @@
           <a:p>
             <a:fld id="{46A9F2F8-7B6D-46B7-8E68-D723B59E620F}" type="datetimeFigureOut">
               <a:rPr lang="en-US" smtClean="0"/>
-              <a:t>1/16/2024</a:t>
+              <a:t>1/23/2024</a:t>
             </a:fld>
             <a:endParaRPr lang="en-US"/>
           </a:p>
@@ -10889,7 +11017,7 @@
           <a:p>
             <a:fld id="{46A9F2F8-7B6D-46B7-8E68-D723B59E620F}" type="datetimeFigureOut">
               <a:rPr lang="en-US" smtClean="0"/>
-              <a:t>1/16/2024</a:t>
+              <a:t>1/23/2024</a:t>
             </a:fld>
             <a:endParaRPr lang="en-US"/>
           </a:p>
@@ -11613,10 +11741,10 @@
       </p:sp>
       <p:grpSp>
         <p:nvGrpSpPr>
-          <p:cNvPr id="88" name="Group 87">
+          <p:cNvPr id="49" name="Group 48">
             <a:extLst>
               <a:ext uri="{FF2B5EF4-FFF2-40B4-BE49-F238E27FC236}">
-                <a16:creationId xmlns:a16="http://schemas.microsoft.com/office/drawing/2014/main" id="{FC674DD5-C14E-7C0E-F3E3-FEF2CCC4CF19}"/>
+                <a16:creationId xmlns:a16="http://schemas.microsoft.com/office/drawing/2014/main" id="{792DF968-189C-9890-7556-396AD822C943}"/>
               </a:ext>
             </a:extLst>
           </p:cNvPr>
@@ -11625,132 +11753,57 @@
         </p:nvGrpSpPr>
         <p:grpSpPr>
           <a:xfrm>
-            <a:off x="186307" y="1084654"/>
-            <a:ext cx="2114287" cy="4875378"/>
-            <a:chOff x="273392" y="1536092"/>
-            <a:chExt cx="2114287" cy="4875378"/>
+            <a:off x="793003" y="1097380"/>
+            <a:ext cx="1352191" cy="1083567"/>
+            <a:chOff x="885400" y="576275"/>
+            <a:chExt cx="1609721" cy="1392808"/>
           </a:xfrm>
         </p:grpSpPr>
-        <p:grpSp>
-          <p:nvGrpSpPr>
-            <p:cNvPr id="49" name="Group 48">
+        <p:pic>
+          <p:nvPicPr>
+            <p:cNvPr id="47" name="Graphic 46" descr="Cloud outline">
               <a:extLst>
                 <a:ext uri="{FF2B5EF4-FFF2-40B4-BE49-F238E27FC236}">
-                  <a16:creationId xmlns:a16="http://schemas.microsoft.com/office/drawing/2014/main" id="{792DF968-189C-9890-7556-396AD822C943}"/>
+                  <a16:creationId xmlns:a16="http://schemas.microsoft.com/office/drawing/2014/main" id="{2709D40A-C6D2-683F-D92D-D96550BAA264}"/>
                 </a:ext>
               </a:extLst>
             </p:cNvPr>
-            <p:cNvGrpSpPr/>
+            <p:cNvPicPr>
+              <a:picLocks noChangeAspect="1"/>
+            </p:cNvPicPr>
             <p:nvPr/>
-          </p:nvGrpSpPr>
-          <p:grpSpPr>
+          </p:nvPicPr>
+          <p:blipFill>
+            <a:blip r:embed="rId3">
+              <a:extLst>
+                <a:ext uri="{28A0092B-C50C-407E-A947-70E740481C1C}">
+                  <a14:useLocalDpi xmlns:a14="http://schemas.microsoft.com/office/drawing/2010/main" val="0"/>
+                </a:ext>
+                <a:ext uri="{96DAC541-7B7A-43D3-8B79-37D633B846F1}">
+                  <asvg:svgBlip xmlns:asvg="http://schemas.microsoft.com/office/drawing/2016/SVG/main" r:embed="rId4"/>
+                </a:ext>
+              </a:extLst>
+            </a:blip>
+            <a:stretch>
+              <a:fillRect/>
+            </a:stretch>
+          </p:blipFill>
+          <p:spPr>
             <a:xfrm>
-              <a:off x="273392" y="1536092"/>
-              <a:ext cx="1983497" cy="1561889"/>
-              <a:chOff x="885400" y="576275"/>
-              <a:chExt cx="1609721" cy="1392808"/>
+              <a:off x="885400" y="576275"/>
+              <a:ext cx="1609721" cy="1392808"/>
             </a:xfrm>
-          </p:grpSpPr>
-          <p:pic>
-            <p:nvPicPr>
-              <p:cNvPr id="47" name="Graphic 46" descr="Cloud outline">
-                <a:extLst>
-                  <a:ext uri="{FF2B5EF4-FFF2-40B4-BE49-F238E27FC236}">
-                    <a16:creationId xmlns:a16="http://schemas.microsoft.com/office/drawing/2014/main" id="{2709D40A-C6D2-683F-D92D-D96550BAA264}"/>
-                  </a:ext>
-                </a:extLst>
-              </p:cNvPr>
-              <p:cNvPicPr>
-                <a:picLocks noChangeAspect="1"/>
-              </p:cNvPicPr>
-              <p:nvPr/>
-            </p:nvPicPr>
-            <p:blipFill>
-              <a:blip r:embed="rId3">
-                <a:extLst>
-                  <a:ext uri="{28A0092B-C50C-407E-A947-70E740481C1C}">
-                    <a14:useLocalDpi xmlns:a14="http://schemas.microsoft.com/office/drawing/2010/main" val="0"/>
-                  </a:ext>
-                  <a:ext uri="{96DAC541-7B7A-43D3-8B79-37D633B846F1}">
-                    <asvg:svgBlip xmlns:asvg="http://schemas.microsoft.com/office/drawing/2016/SVG/main" r:embed="rId4"/>
-                  </a:ext>
-                </a:extLst>
-              </a:blip>
-              <a:stretch>
-                <a:fillRect/>
-              </a:stretch>
-            </p:blipFill>
-            <p:spPr>
-              <a:xfrm>
-                <a:off x="885400" y="576275"/>
-                <a:ext cx="1609721" cy="1392808"/>
-              </a:xfrm>
-              <a:prstGeom prst="rect">
-                <a:avLst/>
-              </a:prstGeom>
-            </p:spPr>
-          </p:pic>
-          <p:sp>
-            <p:nvSpPr>
-              <p:cNvPr id="48" name="Rectangle 47">
-                <a:extLst>
-                  <a:ext uri="{FF2B5EF4-FFF2-40B4-BE49-F238E27FC236}">
-                    <a16:creationId xmlns:a16="http://schemas.microsoft.com/office/drawing/2014/main" id="{D49C385A-5DFC-DFB6-C09E-E682641E449F}"/>
-                  </a:ext>
-                </a:extLst>
-              </p:cNvPr>
-              <p:cNvSpPr/>
-              <p:nvPr/>
-            </p:nvSpPr>
-            <p:spPr>
-              <a:xfrm>
-                <a:off x="885400" y="1421431"/>
-                <a:ext cx="1587778" cy="242852"/>
-              </a:xfrm>
-              <a:prstGeom prst="rect">
-                <a:avLst/>
-              </a:prstGeom>
-              <a:solidFill>
-                <a:schemeClr val="bg1"/>
-              </a:solidFill>
-              <a:ln>
-                <a:solidFill>
-                  <a:schemeClr val="bg1"/>
-                </a:solidFill>
-              </a:ln>
-            </p:spPr>
-            <p:style>
-              <a:lnRef idx="2">
-                <a:schemeClr val="accent1">
-                  <a:shade val="15000"/>
-                </a:schemeClr>
-              </a:lnRef>
-              <a:fillRef idx="1">
-                <a:schemeClr val="accent1"/>
-              </a:fillRef>
-              <a:effectRef idx="0">
-                <a:schemeClr val="accent1"/>
-              </a:effectRef>
-              <a:fontRef idx="minor">
-                <a:schemeClr val="lt1"/>
-              </a:fontRef>
-            </p:style>
-            <p:txBody>
-              <a:bodyPr rtlCol="0" anchor="ctr"/>
-              <a:lstStyle/>
-              <a:p>
-                <a:pPr algn="ctr"/>
-                <a:endParaRPr lang="en-US"/>
-              </a:p>
-            </p:txBody>
-          </p:sp>
-        </p:grpSp>
+            <a:prstGeom prst="rect">
+              <a:avLst/>
+            </a:prstGeom>
+          </p:spPr>
+        </p:pic>
         <p:sp>
           <p:nvSpPr>
-            <p:cNvPr id="17" name="Oval 16">
+            <p:cNvPr id="48" name="Rectangle 47">
               <a:extLst>
                 <a:ext uri="{FF2B5EF4-FFF2-40B4-BE49-F238E27FC236}">
-                  <a16:creationId xmlns:a16="http://schemas.microsoft.com/office/drawing/2014/main" id="{616C2D39-548F-D2A7-CA93-3EB1FAB64116}"/>
+                  <a16:creationId xmlns:a16="http://schemas.microsoft.com/office/drawing/2014/main" id="{D49C385A-5DFC-DFB6-C09E-E682641E449F}"/>
                 </a:ext>
               </a:extLst>
             </p:cNvPr>
@@ -11759,18 +11812,20 @@
           </p:nvSpPr>
           <p:spPr>
             <a:xfrm>
-              <a:off x="525505" y="2584590"/>
-              <a:ext cx="1235869" cy="526310"/>
+              <a:off x="885400" y="1421431"/>
+              <a:ext cx="1587778" cy="242852"/>
             </a:xfrm>
-            <a:prstGeom prst="ellipse">
+            <a:prstGeom prst="rect">
               <a:avLst/>
             </a:prstGeom>
             <a:solidFill>
-              <a:schemeClr val="accent1">
-                <a:lumMod val="20000"/>
-                <a:lumOff val="80000"/>
-              </a:schemeClr>
+              <a:schemeClr val="bg1"/>
             </a:solidFill>
+            <a:ln>
+              <a:solidFill>
+                <a:schemeClr val="bg1"/>
+              </a:solidFill>
+            </a:ln>
           </p:spPr>
           <p:style>
             <a:lnRef idx="2">
@@ -11793,455 +11848,507 @@
             <a:lstStyle/>
             <a:p>
               <a:pPr algn="ctr"/>
-              <a:r>
-                <a:rPr lang="en-US" sz="1050" b="1" dirty="0">
-                  <a:solidFill>
-                    <a:schemeClr val="tx2">
-                      <a:lumMod val="90000"/>
-                      <a:lumOff val="10000"/>
-                    </a:schemeClr>
-                  </a:solidFill>
-                </a:rPr>
-                <a:t>Customers</a:t>
-              </a:r>
-            </a:p>
-          </p:txBody>
-        </p:sp>
-        <p:sp>
-          <p:nvSpPr>
-            <p:cNvPr id="18" name="Oval 17">
-              <a:extLst>
-                <a:ext uri="{FF2B5EF4-FFF2-40B4-BE49-F238E27FC236}">
-                  <a16:creationId xmlns:a16="http://schemas.microsoft.com/office/drawing/2014/main" id="{E1DEAEB0-D978-C722-8955-4FB540D4E913}"/>
-                </a:ext>
-              </a:extLst>
-            </p:cNvPr>
-            <p:cNvSpPr/>
-            <p:nvPr/>
-          </p:nvSpPr>
-          <p:spPr>
-            <a:xfrm>
-              <a:off x="525505" y="5100207"/>
-              <a:ext cx="1235869" cy="526310"/>
-            </a:xfrm>
-            <a:prstGeom prst="ellipse">
-              <a:avLst/>
-            </a:prstGeom>
-            <a:solidFill>
-              <a:schemeClr val="accent5">
-                <a:lumMod val="20000"/>
-                <a:lumOff val="80000"/>
-              </a:schemeClr>
-            </a:solidFill>
-          </p:spPr>
-          <p:style>
-            <a:lnRef idx="2">
-              <a:schemeClr val="accent1">
-                <a:shade val="15000"/>
-              </a:schemeClr>
-            </a:lnRef>
-            <a:fillRef idx="1">
-              <a:schemeClr val="accent1"/>
-            </a:fillRef>
-            <a:effectRef idx="0">
-              <a:schemeClr val="accent1"/>
-            </a:effectRef>
-            <a:fontRef idx="minor">
-              <a:schemeClr val="lt1"/>
-            </a:fontRef>
-          </p:style>
-          <p:txBody>
-            <a:bodyPr rtlCol="0" anchor="ctr"/>
-            <a:lstStyle/>
-            <a:p>
-              <a:pPr algn="ctr"/>
-              <a:r>
-                <a:rPr lang="en-US" sz="1100" b="1" dirty="0">
-                  <a:solidFill>
-                    <a:schemeClr val="tx2">
-                      <a:lumMod val="90000"/>
-                      <a:lumOff val="10000"/>
-                    </a:schemeClr>
-                  </a:solidFill>
-                </a:rPr>
-                <a:t>Agents</a:t>
-              </a:r>
-            </a:p>
-          </p:txBody>
-        </p:sp>
-        <p:sp>
-          <p:nvSpPr>
-            <p:cNvPr id="19" name="Oval 18">
-              <a:extLst>
-                <a:ext uri="{FF2B5EF4-FFF2-40B4-BE49-F238E27FC236}">
-                  <a16:creationId xmlns:a16="http://schemas.microsoft.com/office/drawing/2014/main" id="{52F8C555-9713-2224-5813-362BFE6D9335}"/>
-                </a:ext>
-              </a:extLst>
-            </p:cNvPr>
-            <p:cNvSpPr/>
-            <p:nvPr/>
-          </p:nvSpPr>
-          <p:spPr>
-            <a:xfrm>
-              <a:off x="677905" y="5252607"/>
-              <a:ext cx="1235869" cy="526310"/>
-            </a:xfrm>
-            <a:prstGeom prst="ellipse">
-              <a:avLst/>
-            </a:prstGeom>
-            <a:solidFill>
-              <a:schemeClr val="accent5">
-                <a:lumMod val="20000"/>
-                <a:lumOff val="80000"/>
-              </a:schemeClr>
-            </a:solidFill>
-          </p:spPr>
-          <p:style>
-            <a:lnRef idx="2">
-              <a:schemeClr val="accent1">
-                <a:shade val="15000"/>
-              </a:schemeClr>
-            </a:lnRef>
-            <a:fillRef idx="1">
-              <a:schemeClr val="accent1"/>
-            </a:fillRef>
-            <a:effectRef idx="0">
-              <a:schemeClr val="accent1"/>
-            </a:effectRef>
-            <a:fontRef idx="minor">
-              <a:schemeClr val="lt1"/>
-            </a:fontRef>
-          </p:style>
-          <p:txBody>
-            <a:bodyPr rtlCol="0" anchor="ctr"/>
-            <a:lstStyle/>
-            <a:p>
-              <a:pPr algn="ctr"/>
-              <a:r>
-                <a:rPr lang="en-US" sz="1100" b="1" dirty="0">
-                  <a:solidFill>
-                    <a:schemeClr val="tx2">
-                      <a:lumMod val="90000"/>
-                      <a:lumOff val="10000"/>
-                    </a:schemeClr>
-                  </a:solidFill>
-                </a:rPr>
-                <a:t>Agents</a:t>
-              </a:r>
-            </a:p>
-          </p:txBody>
-        </p:sp>
-        <p:sp>
-          <p:nvSpPr>
-            <p:cNvPr id="20" name="Oval 19">
-              <a:extLst>
-                <a:ext uri="{FF2B5EF4-FFF2-40B4-BE49-F238E27FC236}">
-                  <a16:creationId xmlns:a16="http://schemas.microsoft.com/office/drawing/2014/main" id="{B67EA709-5807-E274-3D3B-F70C9A7FAFB6}"/>
-                </a:ext>
-              </a:extLst>
-            </p:cNvPr>
-            <p:cNvSpPr/>
-            <p:nvPr/>
-          </p:nvSpPr>
-          <p:spPr>
-            <a:xfrm>
-              <a:off x="830305" y="5405007"/>
-              <a:ext cx="1235869" cy="526310"/>
-            </a:xfrm>
-            <a:prstGeom prst="ellipse">
-              <a:avLst/>
-            </a:prstGeom>
-            <a:solidFill>
-              <a:schemeClr val="accent5">
-                <a:lumMod val="20000"/>
-                <a:lumOff val="80000"/>
-              </a:schemeClr>
-            </a:solidFill>
-          </p:spPr>
-          <p:style>
-            <a:lnRef idx="2">
-              <a:schemeClr val="accent1">
-                <a:shade val="15000"/>
-              </a:schemeClr>
-            </a:lnRef>
-            <a:fillRef idx="1">
-              <a:schemeClr val="accent1"/>
-            </a:fillRef>
-            <a:effectRef idx="0">
-              <a:schemeClr val="accent1"/>
-            </a:effectRef>
-            <a:fontRef idx="minor">
-              <a:schemeClr val="lt1"/>
-            </a:fontRef>
-          </p:style>
-          <p:txBody>
-            <a:bodyPr rtlCol="0" anchor="ctr"/>
-            <a:lstStyle/>
-            <a:p>
-              <a:pPr algn="ctr"/>
-              <a:r>
-                <a:rPr lang="en-US" sz="1100" b="1" dirty="0">
-                  <a:solidFill>
-                    <a:schemeClr val="tx2">
-                      <a:lumMod val="90000"/>
-                      <a:lumOff val="10000"/>
-                    </a:schemeClr>
-                  </a:solidFill>
-                </a:rPr>
-                <a:t>Agents</a:t>
-              </a:r>
-            </a:p>
-          </p:txBody>
-        </p:sp>
-        <p:sp>
-          <p:nvSpPr>
-            <p:cNvPr id="22" name="Oval 21">
-              <a:extLst>
-                <a:ext uri="{FF2B5EF4-FFF2-40B4-BE49-F238E27FC236}">
-                  <a16:creationId xmlns:a16="http://schemas.microsoft.com/office/drawing/2014/main" id="{EBADDC75-0CCD-8644-1185-A084C9E1A8F0}"/>
-                </a:ext>
-              </a:extLst>
-            </p:cNvPr>
-            <p:cNvSpPr/>
-            <p:nvPr/>
-          </p:nvSpPr>
-          <p:spPr>
-            <a:xfrm>
-              <a:off x="677905" y="2736990"/>
-              <a:ext cx="1235869" cy="526310"/>
-            </a:xfrm>
-            <a:prstGeom prst="ellipse">
-              <a:avLst/>
-            </a:prstGeom>
-            <a:solidFill>
-              <a:schemeClr val="accent1">
-                <a:lumMod val="20000"/>
-                <a:lumOff val="80000"/>
-              </a:schemeClr>
-            </a:solidFill>
-          </p:spPr>
-          <p:style>
-            <a:lnRef idx="2">
-              <a:schemeClr val="accent1">
-                <a:shade val="15000"/>
-              </a:schemeClr>
-            </a:lnRef>
-            <a:fillRef idx="1">
-              <a:schemeClr val="accent1"/>
-            </a:fillRef>
-            <a:effectRef idx="0">
-              <a:schemeClr val="accent1"/>
-            </a:effectRef>
-            <a:fontRef idx="minor">
-              <a:schemeClr val="lt1"/>
-            </a:fontRef>
-          </p:style>
-          <p:txBody>
-            <a:bodyPr rtlCol="0" anchor="ctr"/>
-            <a:lstStyle/>
-            <a:p>
-              <a:pPr algn="ctr"/>
-              <a:r>
-                <a:rPr lang="en-US" sz="1050" b="1" dirty="0">
-                  <a:solidFill>
-                    <a:schemeClr val="tx2">
-                      <a:lumMod val="90000"/>
-                      <a:lumOff val="10000"/>
-                    </a:schemeClr>
-                  </a:solidFill>
-                </a:rPr>
-                <a:t>Customers</a:t>
-              </a:r>
-            </a:p>
-          </p:txBody>
-        </p:sp>
-        <p:sp>
-          <p:nvSpPr>
-            <p:cNvPr id="23" name="Oval 22">
-              <a:extLst>
-                <a:ext uri="{FF2B5EF4-FFF2-40B4-BE49-F238E27FC236}">
-                  <a16:creationId xmlns:a16="http://schemas.microsoft.com/office/drawing/2014/main" id="{9C08127C-51CF-F207-E06D-D5A418433501}"/>
-                </a:ext>
-              </a:extLst>
-            </p:cNvPr>
-            <p:cNvSpPr/>
-            <p:nvPr/>
-          </p:nvSpPr>
-          <p:spPr>
-            <a:xfrm>
-              <a:off x="830305" y="2889390"/>
-              <a:ext cx="1235869" cy="526310"/>
-            </a:xfrm>
-            <a:prstGeom prst="ellipse">
-              <a:avLst/>
-            </a:prstGeom>
-            <a:solidFill>
-              <a:schemeClr val="accent1">
-                <a:lumMod val="20000"/>
-                <a:lumOff val="80000"/>
-              </a:schemeClr>
-            </a:solidFill>
-          </p:spPr>
-          <p:style>
-            <a:lnRef idx="2">
-              <a:schemeClr val="accent1">
-                <a:shade val="15000"/>
-              </a:schemeClr>
-            </a:lnRef>
-            <a:fillRef idx="1">
-              <a:schemeClr val="accent1"/>
-            </a:fillRef>
-            <a:effectRef idx="0">
-              <a:schemeClr val="accent1"/>
-            </a:effectRef>
-            <a:fontRef idx="minor">
-              <a:schemeClr val="lt1"/>
-            </a:fontRef>
-          </p:style>
-          <p:txBody>
-            <a:bodyPr rtlCol="0" anchor="ctr"/>
-            <a:lstStyle/>
-            <a:p>
-              <a:pPr algn="ctr"/>
-              <a:r>
-                <a:rPr lang="en-US" sz="1050" b="1" dirty="0">
-                  <a:solidFill>
-                    <a:schemeClr val="tx2">
-                      <a:lumMod val="90000"/>
-                      <a:lumOff val="10000"/>
-                    </a:schemeClr>
-                  </a:solidFill>
-                </a:rPr>
-                <a:t>Customers</a:t>
-              </a:r>
-            </a:p>
-          </p:txBody>
-        </p:sp>
-        <p:cxnSp>
-          <p:nvCxnSpPr>
-            <p:cNvPr id="29" name="Straight Connector 28">
-              <a:extLst>
-                <a:ext uri="{FF2B5EF4-FFF2-40B4-BE49-F238E27FC236}">
-                  <a16:creationId xmlns:a16="http://schemas.microsoft.com/office/drawing/2014/main" id="{7743E1A5-ACA3-8A41-52C1-5DA840E11EED}"/>
-                </a:ext>
-              </a:extLst>
-            </p:cNvPr>
-            <p:cNvCxnSpPr>
-              <a:cxnSpLocks/>
-            </p:cNvCxnSpPr>
-            <p:nvPr/>
-          </p:nvCxnSpPr>
-          <p:spPr>
-            <a:xfrm>
-              <a:off x="2382055" y="2221476"/>
-              <a:ext cx="5624" cy="4189994"/>
-            </a:xfrm>
-            <a:prstGeom prst="line">
-              <a:avLst/>
-            </a:prstGeom>
-            <a:ln w="19050" cap="flat" cmpd="sng" algn="ctr">
-              <a:solidFill>
-                <a:schemeClr val="dk1"/>
-              </a:solidFill>
-              <a:prstDash val="dash"/>
-              <a:round/>
-              <a:headEnd type="none" w="med" len="med"/>
-              <a:tailEnd type="none" w="med" len="med"/>
-            </a:ln>
-          </p:spPr>
-          <p:style>
-            <a:lnRef idx="0">
-              <a:scrgbClr r="0" g="0" b="0"/>
-            </a:lnRef>
-            <a:fillRef idx="0">
-              <a:scrgbClr r="0" g="0" b="0"/>
-            </a:fillRef>
-            <a:effectRef idx="0">
-              <a:scrgbClr r="0" g="0" b="0"/>
-            </a:effectRef>
-            <a:fontRef idx="minor">
-              <a:schemeClr val="tx1"/>
-            </a:fontRef>
-          </p:style>
-        </p:cxnSp>
-        <p:sp>
-          <p:nvSpPr>
-            <p:cNvPr id="35" name="TextBox 34">
-              <a:extLst>
-                <a:ext uri="{FF2B5EF4-FFF2-40B4-BE49-F238E27FC236}">
-                  <a16:creationId xmlns:a16="http://schemas.microsoft.com/office/drawing/2014/main" id="{639700A1-C78B-F9F5-0207-66871A0B0F29}"/>
-                </a:ext>
-              </a:extLst>
-            </p:cNvPr>
-            <p:cNvSpPr txBox="1"/>
-            <p:nvPr/>
-          </p:nvSpPr>
-          <p:spPr>
-            <a:xfrm>
-              <a:off x="441453" y="3671126"/>
-              <a:ext cx="1860762" cy="1173655"/>
-            </a:xfrm>
-            <a:prstGeom prst="rect">
-              <a:avLst/>
-            </a:prstGeom>
-            <a:noFill/>
-          </p:spPr>
-          <p:txBody>
-            <a:bodyPr wrap="square" rtlCol="0">
-              <a:spAutoFit/>
-            </a:bodyPr>
-            <a:lstStyle/>
-            <a:p>
-              <a:pPr algn="r">
-                <a:lnSpc>
-                  <a:spcPct val="150000"/>
-                </a:lnSpc>
-              </a:pPr>
-              <a:r>
-                <a:rPr lang="en-US" sz="1200" dirty="0"/>
-                <a:t>New Insurance Quote</a:t>
-              </a:r>
-            </a:p>
-            <a:p>
-              <a:pPr algn="r">
-                <a:lnSpc>
-                  <a:spcPct val="150000"/>
-                </a:lnSpc>
-              </a:pPr>
-              <a:r>
-                <a:rPr lang="en-US" sz="1200" dirty="0"/>
-                <a:t>New Claim</a:t>
-              </a:r>
-            </a:p>
-            <a:p>
-              <a:pPr algn="r">
-                <a:lnSpc>
-                  <a:spcPct val="150000"/>
-                </a:lnSpc>
-              </a:pPr>
-              <a:r>
-                <a:rPr lang="en-US" sz="1200" dirty="0"/>
-                <a:t>Commercial Insurance</a:t>
-              </a:r>
-            </a:p>
-            <a:p>
-              <a:pPr algn="r">
-                <a:lnSpc>
-                  <a:spcPct val="150000"/>
-                </a:lnSpc>
-              </a:pPr>
-              <a:r>
-                <a:rPr lang="en-US" sz="1200" dirty="0"/>
-                <a:t>Worker Compensation</a:t>
-              </a:r>
-              <a:r>
-                <a:rPr lang="en-US" sz="1200" b="1" dirty="0"/>
-                <a:t> </a:t>
-              </a:r>
+              <a:endParaRPr lang="en-US"/>
             </a:p>
           </p:txBody>
         </p:sp>
       </p:grpSp>
+      <p:sp>
+        <p:nvSpPr>
+          <p:cNvPr id="17" name="Oval 16">
+            <a:extLst>
+              <a:ext uri="{FF2B5EF4-FFF2-40B4-BE49-F238E27FC236}">
+                <a16:creationId xmlns:a16="http://schemas.microsoft.com/office/drawing/2014/main" id="{616C2D39-548F-D2A7-CA93-3EB1FAB64116}"/>
+              </a:ext>
+            </a:extLst>
+          </p:cNvPr>
+          <p:cNvSpPr/>
+          <p:nvPr/>
+        </p:nvSpPr>
+        <p:spPr>
+          <a:xfrm>
+            <a:off x="753313" y="1867596"/>
+            <a:ext cx="1266774" cy="345589"/>
+          </a:xfrm>
+          <a:prstGeom prst="ellipse">
+            <a:avLst/>
+          </a:prstGeom>
+          <a:solidFill>
+            <a:schemeClr val="accent1">
+              <a:lumMod val="20000"/>
+              <a:lumOff val="80000"/>
+            </a:schemeClr>
+          </a:solidFill>
+        </p:spPr>
+        <p:style>
+          <a:lnRef idx="2">
+            <a:schemeClr val="accent1">
+              <a:shade val="15000"/>
+            </a:schemeClr>
+          </a:lnRef>
+          <a:fillRef idx="1">
+            <a:schemeClr val="accent1"/>
+          </a:fillRef>
+          <a:effectRef idx="0">
+            <a:schemeClr val="accent1"/>
+          </a:effectRef>
+          <a:fontRef idx="minor">
+            <a:schemeClr val="lt1"/>
+          </a:fontRef>
+        </p:style>
+        <p:txBody>
+          <a:bodyPr rtlCol="0" anchor="ctr"/>
+          <a:lstStyle/>
+          <a:p>
+            <a:pPr algn="ctr"/>
+            <a:r>
+              <a:rPr lang="en-US" sz="1050" b="1" dirty="0">
+                <a:solidFill>
+                  <a:schemeClr val="tx2">
+                    <a:lumMod val="90000"/>
+                    <a:lumOff val="10000"/>
+                  </a:schemeClr>
+                </a:solidFill>
+              </a:rPr>
+              <a:t>Customers</a:t>
+            </a:r>
+          </a:p>
+        </p:txBody>
+      </p:sp>
+      <p:sp>
+        <p:nvSpPr>
+          <p:cNvPr id="18" name="Oval 17">
+            <a:extLst>
+              <a:ext uri="{FF2B5EF4-FFF2-40B4-BE49-F238E27FC236}">
+                <a16:creationId xmlns:a16="http://schemas.microsoft.com/office/drawing/2014/main" id="{E1DEAEB0-D978-C722-8955-4FB540D4E913}"/>
+              </a:ext>
+            </a:extLst>
+          </p:cNvPr>
+          <p:cNvSpPr/>
+          <p:nvPr/>
+        </p:nvSpPr>
+        <p:spPr>
+          <a:xfrm>
+            <a:off x="753313" y="2475063"/>
+            <a:ext cx="1266774" cy="345589"/>
+          </a:xfrm>
+          <a:prstGeom prst="ellipse">
+            <a:avLst/>
+          </a:prstGeom>
+          <a:solidFill>
+            <a:schemeClr val="accent5">
+              <a:lumMod val="20000"/>
+              <a:lumOff val="80000"/>
+            </a:schemeClr>
+          </a:solidFill>
+        </p:spPr>
+        <p:style>
+          <a:lnRef idx="2">
+            <a:schemeClr val="accent1">
+              <a:shade val="15000"/>
+            </a:schemeClr>
+          </a:lnRef>
+          <a:fillRef idx="1">
+            <a:schemeClr val="accent1"/>
+          </a:fillRef>
+          <a:effectRef idx="0">
+            <a:schemeClr val="accent1"/>
+          </a:effectRef>
+          <a:fontRef idx="minor">
+            <a:schemeClr val="lt1"/>
+          </a:fontRef>
+        </p:style>
+        <p:txBody>
+          <a:bodyPr rtlCol="0" anchor="ctr"/>
+          <a:lstStyle/>
+          <a:p>
+            <a:pPr algn="ctr"/>
+            <a:r>
+              <a:rPr lang="en-US" sz="1100" b="1" dirty="0">
+                <a:solidFill>
+                  <a:schemeClr val="tx2">
+                    <a:lumMod val="90000"/>
+                    <a:lumOff val="10000"/>
+                  </a:schemeClr>
+                </a:solidFill>
+              </a:rPr>
+              <a:t>Agents</a:t>
+            </a:r>
+          </a:p>
+        </p:txBody>
+      </p:sp>
+      <p:sp>
+        <p:nvSpPr>
+          <p:cNvPr id="19" name="Oval 18">
+            <a:extLst>
+              <a:ext uri="{FF2B5EF4-FFF2-40B4-BE49-F238E27FC236}">
+                <a16:creationId xmlns:a16="http://schemas.microsoft.com/office/drawing/2014/main" id="{52F8C555-9713-2224-5813-362BFE6D9335}"/>
+              </a:ext>
+            </a:extLst>
+          </p:cNvPr>
+          <p:cNvSpPr/>
+          <p:nvPr/>
+        </p:nvSpPr>
+        <p:spPr>
+          <a:xfrm>
+            <a:off x="782485" y="2535851"/>
+            <a:ext cx="1266774" cy="345589"/>
+          </a:xfrm>
+          <a:prstGeom prst="ellipse">
+            <a:avLst/>
+          </a:prstGeom>
+          <a:solidFill>
+            <a:schemeClr val="accent5">
+              <a:lumMod val="20000"/>
+              <a:lumOff val="80000"/>
+            </a:schemeClr>
+          </a:solidFill>
+        </p:spPr>
+        <p:style>
+          <a:lnRef idx="2">
+            <a:schemeClr val="accent1">
+              <a:shade val="15000"/>
+            </a:schemeClr>
+          </a:lnRef>
+          <a:fillRef idx="1">
+            <a:schemeClr val="accent1"/>
+          </a:fillRef>
+          <a:effectRef idx="0">
+            <a:schemeClr val="accent1"/>
+          </a:effectRef>
+          <a:fontRef idx="minor">
+            <a:schemeClr val="lt1"/>
+          </a:fontRef>
+        </p:style>
+        <p:txBody>
+          <a:bodyPr rtlCol="0" anchor="ctr"/>
+          <a:lstStyle/>
+          <a:p>
+            <a:pPr algn="ctr"/>
+            <a:r>
+              <a:rPr lang="en-US" sz="1100" b="1" dirty="0">
+                <a:solidFill>
+                  <a:schemeClr val="tx2">
+                    <a:lumMod val="90000"/>
+                    <a:lumOff val="10000"/>
+                  </a:schemeClr>
+                </a:solidFill>
+              </a:rPr>
+              <a:t>Agents</a:t>
+            </a:r>
+          </a:p>
+        </p:txBody>
+      </p:sp>
+      <p:sp>
+        <p:nvSpPr>
+          <p:cNvPr id="20" name="Oval 19">
+            <a:extLst>
+              <a:ext uri="{FF2B5EF4-FFF2-40B4-BE49-F238E27FC236}">
+                <a16:creationId xmlns:a16="http://schemas.microsoft.com/office/drawing/2014/main" id="{B67EA709-5807-E274-3D3B-F70C9A7FAFB6}"/>
+              </a:ext>
+            </a:extLst>
+          </p:cNvPr>
+          <p:cNvSpPr/>
+          <p:nvPr/>
+        </p:nvSpPr>
+        <p:spPr>
+          <a:xfrm>
+            <a:off x="821663" y="2600137"/>
+            <a:ext cx="1266774" cy="345589"/>
+          </a:xfrm>
+          <a:prstGeom prst="ellipse">
+            <a:avLst/>
+          </a:prstGeom>
+          <a:solidFill>
+            <a:schemeClr val="accent5">
+              <a:lumMod val="20000"/>
+              <a:lumOff val="80000"/>
+            </a:schemeClr>
+          </a:solidFill>
+        </p:spPr>
+        <p:style>
+          <a:lnRef idx="2">
+            <a:schemeClr val="accent1">
+              <a:shade val="15000"/>
+            </a:schemeClr>
+          </a:lnRef>
+          <a:fillRef idx="1">
+            <a:schemeClr val="accent1"/>
+          </a:fillRef>
+          <a:effectRef idx="0">
+            <a:schemeClr val="accent1"/>
+          </a:effectRef>
+          <a:fontRef idx="minor">
+            <a:schemeClr val="lt1"/>
+          </a:fontRef>
+        </p:style>
+        <p:txBody>
+          <a:bodyPr rtlCol="0" anchor="ctr"/>
+          <a:lstStyle/>
+          <a:p>
+            <a:pPr algn="ctr"/>
+            <a:r>
+              <a:rPr lang="en-US" sz="1100" b="1" dirty="0">
+                <a:solidFill>
+                  <a:schemeClr val="tx2">
+                    <a:lumMod val="90000"/>
+                    <a:lumOff val="10000"/>
+                  </a:schemeClr>
+                </a:solidFill>
+              </a:rPr>
+              <a:t>Agents</a:t>
+            </a:r>
+          </a:p>
+        </p:txBody>
+      </p:sp>
+      <p:sp>
+        <p:nvSpPr>
+          <p:cNvPr id="22" name="Oval 21">
+            <a:extLst>
+              <a:ext uri="{FF2B5EF4-FFF2-40B4-BE49-F238E27FC236}">
+                <a16:creationId xmlns:a16="http://schemas.microsoft.com/office/drawing/2014/main" id="{EBADDC75-0CCD-8644-1185-A084C9E1A8F0}"/>
+              </a:ext>
+            </a:extLst>
+          </p:cNvPr>
+          <p:cNvSpPr/>
+          <p:nvPr/>
+        </p:nvSpPr>
+        <p:spPr>
+          <a:xfrm>
+            <a:off x="802652" y="1929475"/>
+            <a:ext cx="1266774" cy="345589"/>
+          </a:xfrm>
+          <a:prstGeom prst="ellipse">
+            <a:avLst/>
+          </a:prstGeom>
+          <a:solidFill>
+            <a:schemeClr val="accent1">
+              <a:lumMod val="20000"/>
+              <a:lumOff val="80000"/>
+            </a:schemeClr>
+          </a:solidFill>
+        </p:spPr>
+        <p:style>
+          <a:lnRef idx="2">
+            <a:schemeClr val="accent1">
+              <a:shade val="15000"/>
+            </a:schemeClr>
+          </a:lnRef>
+          <a:fillRef idx="1">
+            <a:schemeClr val="accent1"/>
+          </a:fillRef>
+          <a:effectRef idx="0">
+            <a:schemeClr val="accent1"/>
+          </a:effectRef>
+          <a:fontRef idx="minor">
+            <a:schemeClr val="lt1"/>
+          </a:fontRef>
+        </p:style>
+        <p:txBody>
+          <a:bodyPr rtlCol="0" anchor="ctr"/>
+          <a:lstStyle/>
+          <a:p>
+            <a:pPr algn="ctr"/>
+            <a:r>
+              <a:rPr lang="en-US" sz="1050" b="1" dirty="0">
+                <a:solidFill>
+                  <a:schemeClr val="tx2">
+                    <a:lumMod val="90000"/>
+                    <a:lumOff val="10000"/>
+                  </a:schemeClr>
+                </a:solidFill>
+              </a:rPr>
+              <a:t>Customers</a:t>
+            </a:r>
+          </a:p>
+        </p:txBody>
+      </p:sp>
+      <p:sp>
+        <p:nvSpPr>
+          <p:cNvPr id="23" name="Oval 22">
+            <a:extLst>
+              <a:ext uri="{FF2B5EF4-FFF2-40B4-BE49-F238E27FC236}">
+                <a16:creationId xmlns:a16="http://schemas.microsoft.com/office/drawing/2014/main" id="{9C08127C-51CF-F207-E06D-D5A418433501}"/>
+              </a:ext>
+            </a:extLst>
+          </p:cNvPr>
+          <p:cNvSpPr/>
+          <p:nvPr/>
+        </p:nvSpPr>
+        <p:spPr>
+          <a:xfrm>
+            <a:off x="841692" y="1991887"/>
+            <a:ext cx="1266774" cy="345589"/>
+          </a:xfrm>
+          <a:prstGeom prst="ellipse">
+            <a:avLst/>
+          </a:prstGeom>
+          <a:solidFill>
+            <a:schemeClr val="accent1">
+              <a:lumMod val="20000"/>
+              <a:lumOff val="80000"/>
+            </a:schemeClr>
+          </a:solidFill>
+        </p:spPr>
+        <p:style>
+          <a:lnRef idx="2">
+            <a:schemeClr val="accent1">
+              <a:shade val="15000"/>
+            </a:schemeClr>
+          </a:lnRef>
+          <a:fillRef idx="1">
+            <a:schemeClr val="accent1"/>
+          </a:fillRef>
+          <a:effectRef idx="0">
+            <a:schemeClr val="accent1"/>
+          </a:effectRef>
+          <a:fontRef idx="minor">
+            <a:schemeClr val="lt1"/>
+          </a:fontRef>
+        </p:style>
+        <p:txBody>
+          <a:bodyPr rtlCol="0" anchor="ctr"/>
+          <a:lstStyle/>
+          <a:p>
+            <a:pPr algn="ctr"/>
+            <a:r>
+              <a:rPr lang="en-US" sz="1050" b="1" dirty="0">
+                <a:solidFill>
+                  <a:schemeClr val="tx2">
+                    <a:lumMod val="90000"/>
+                    <a:lumOff val="10000"/>
+                  </a:schemeClr>
+                </a:solidFill>
+              </a:rPr>
+              <a:t>Customers</a:t>
+            </a:r>
+          </a:p>
+        </p:txBody>
+      </p:sp>
+      <p:cxnSp>
+        <p:nvCxnSpPr>
+          <p:cNvPr id="29" name="Straight Connector 28">
+            <a:extLst>
+              <a:ext uri="{FF2B5EF4-FFF2-40B4-BE49-F238E27FC236}">
+                <a16:creationId xmlns:a16="http://schemas.microsoft.com/office/drawing/2014/main" id="{7743E1A5-ACA3-8A41-52C1-5DA840E11EED}"/>
+              </a:ext>
+            </a:extLst>
+          </p:cNvPr>
+          <p:cNvCxnSpPr>
+            <a:cxnSpLocks/>
+          </p:cNvCxnSpPr>
+          <p:nvPr/>
+        </p:nvCxnSpPr>
+        <p:spPr>
+          <a:xfrm>
+            <a:off x="2294970" y="1770038"/>
+            <a:ext cx="18518" cy="4404984"/>
+          </a:xfrm>
+          <a:prstGeom prst="line">
+            <a:avLst/>
+          </a:prstGeom>
+          <a:ln w="19050" cap="flat" cmpd="sng" algn="ctr">
+            <a:solidFill>
+              <a:schemeClr val="dk1"/>
+            </a:solidFill>
+            <a:prstDash val="dash"/>
+            <a:round/>
+            <a:headEnd type="none" w="med" len="med"/>
+            <a:tailEnd type="none" w="med" len="med"/>
+          </a:ln>
+        </p:spPr>
+        <p:style>
+          <a:lnRef idx="0">
+            <a:scrgbClr r="0" g="0" b="0"/>
+          </a:lnRef>
+          <a:fillRef idx="0">
+            <a:scrgbClr r="0" g="0" b="0"/>
+          </a:fillRef>
+          <a:effectRef idx="0">
+            <a:scrgbClr r="0" g="0" b="0"/>
+          </a:effectRef>
+          <a:fontRef idx="minor">
+            <a:schemeClr val="tx1"/>
+          </a:fontRef>
+        </p:style>
+      </p:cxnSp>
+      <p:sp>
+        <p:nvSpPr>
+          <p:cNvPr id="35" name="TextBox 34">
+            <a:extLst>
+              <a:ext uri="{FF2B5EF4-FFF2-40B4-BE49-F238E27FC236}">
+                <a16:creationId xmlns:a16="http://schemas.microsoft.com/office/drawing/2014/main" id="{639700A1-C78B-F9F5-0207-66871A0B0F29}"/>
+              </a:ext>
+            </a:extLst>
+          </p:cNvPr>
+          <p:cNvSpPr txBox="1"/>
+          <p:nvPr/>
+        </p:nvSpPr>
+        <p:spPr>
+          <a:xfrm>
+            <a:off x="359320" y="5222616"/>
+            <a:ext cx="1860762" cy="1083566"/>
+          </a:xfrm>
+          <a:prstGeom prst="rect">
+            <a:avLst/>
+          </a:prstGeom>
+          <a:noFill/>
+        </p:spPr>
+        <p:txBody>
+          <a:bodyPr wrap="square" rtlCol="0">
+            <a:spAutoFit/>
+          </a:bodyPr>
+          <a:lstStyle/>
+          <a:p>
+            <a:pPr algn="r">
+              <a:lnSpc>
+                <a:spcPct val="150000"/>
+              </a:lnSpc>
+            </a:pPr>
+            <a:r>
+              <a:rPr lang="en-US" sz="1100" dirty="0"/>
+              <a:t>New Insurance Quote</a:t>
+            </a:r>
+          </a:p>
+          <a:p>
+            <a:pPr algn="r">
+              <a:lnSpc>
+                <a:spcPct val="150000"/>
+              </a:lnSpc>
+            </a:pPr>
+            <a:r>
+              <a:rPr lang="en-US" sz="1100" dirty="0"/>
+              <a:t>New Claim</a:t>
+            </a:r>
+          </a:p>
+          <a:p>
+            <a:pPr algn="r">
+              <a:lnSpc>
+                <a:spcPct val="150000"/>
+              </a:lnSpc>
+            </a:pPr>
+            <a:r>
+              <a:rPr lang="en-US" sz="1100" dirty="0"/>
+              <a:t>Commercial Insurance</a:t>
+            </a:r>
+          </a:p>
+          <a:p>
+            <a:pPr algn="r">
+              <a:lnSpc>
+                <a:spcPct val="150000"/>
+              </a:lnSpc>
+            </a:pPr>
+            <a:r>
+              <a:rPr lang="en-US" sz="1100" dirty="0"/>
+              <a:t>Worker Compensation</a:t>
+            </a:r>
+            <a:r>
+              <a:rPr lang="en-US" sz="1100" b="1" dirty="0"/>
+              <a:t> </a:t>
+            </a:r>
+          </a:p>
+        </p:txBody>
+      </p:sp>
       <p:grpSp>
         <p:nvGrpSpPr>
           <p:cNvPr id="84" name="Group 83">
@@ -14635,6 +14742,416 @@
           </a:p>
         </p:txBody>
       </p:sp>
+      <p:pic>
+        <p:nvPicPr>
+          <p:cNvPr id="16" name="Picture 15">
+            <a:extLst>
+              <a:ext uri="{FF2B5EF4-FFF2-40B4-BE49-F238E27FC236}">
+                <a16:creationId xmlns:a16="http://schemas.microsoft.com/office/drawing/2014/main" id="{663EA680-3407-FBDE-1D17-EFA90FF40552}"/>
+              </a:ext>
+            </a:extLst>
+          </p:cNvPr>
+          <p:cNvPicPr>
+            <a:picLocks noChangeAspect="1"/>
+          </p:cNvPicPr>
+          <p:nvPr/>
+        </p:nvPicPr>
+        <p:blipFill rotWithShape="1">
+          <a:blip r:embed="rId5"/>
+          <a:srcRect b="40944"/>
+          <a:stretch/>
+        </p:blipFill>
+        <p:spPr>
+          <a:xfrm>
+            <a:off x="1435212" y="3770534"/>
+            <a:ext cx="586873" cy="413207"/>
+          </a:xfrm>
+          <a:prstGeom prst="rect">
+            <a:avLst/>
+          </a:prstGeom>
+        </p:spPr>
+      </p:pic>
+      <p:pic>
+        <p:nvPicPr>
+          <p:cNvPr id="28" name="Picture 27">
+            <a:extLst>
+              <a:ext uri="{FF2B5EF4-FFF2-40B4-BE49-F238E27FC236}">
+                <a16:creationId xmlns:a16="http://schemas.microsoft.com/office/drawing/2014/main" id="{27D2B49A-EB10-CA9E-4FE8-ED85BCD4FD72}"/>
+              </a:ext>
+            </a:extLst>
+          </p:cNvPr>
+          <p:cNvPicPr>
+            <a:picLocks noChangeAspect="1"/>
+          </p:cNvPicPr>
+          <p:nvPr/>
+        </p:nvPicPr>
+        <p:blipFill rotWithShape="1">
+          <a:blip r:embed="rId6"/>
+          <a:srcRect b="32271"/>
+          <a:stretch/>
+        </p:blipFill>
+        <p:spPr>
+          <a:xfrm>
+            <a:off x="1427863" y="4421103"/>
+            <a:ext cx="622367" cy="447326"/>
+          </a:xfrm>
+          <a:prstGeom prst="rect">
+            <a:avLst/>
+          </a:prstGeom>
+        </p:spPr>
+      </p:pic>
+      <p:pic>
+        <p:nvPicPr>
+          <p:cNvPr id="31" name="Picture 30">
+            <a:extLst>
+              <a:ext uri="{FF2B5EF4-FFF2-40B4-BE49-F238E27FC236}">
+                <a16:creationId xmlns:a16="http://schemas.microsoft.com/office/drawing/2014/main" id="{7A505E37-E478-441B-428D-A9F948994094}"/>
+              </a:ext>
+            </a:extLst>
+          </p:cNvPr>
+          <p:cNvPicPr>
+            <a:picLocks noChangeAspect="1"/>
+          </p:cNvPicPr>
+          <p:nvPr/>
+        </p:nvPicPr>
+        <p:blipFill rotWithShape="1">
+          <a:blip r:embed="rId7"/>
+          <a:srcRect b="42363"/>
+          <a:stretch/>
+        </p:blipFill>
+        <p:spPr>
+          <a:xfrm>
+            <a:off x="688487" y="3809883"/>
+            <a:ext cx="586873" cy="383355"/>
+          </a:xfrm>
+          <a:prstGeom prst="rect">
+            <a:avLst/>
+          </a:prstGeom>
+        </p:spPr>
+      </p:pic>
+      <p:pic>
+        <p:nvPicPr>
+          <p:cNvPr id="33" name="Picture 32">
+            <a:extLst>
+              <a:ext uri="{FF2B5EF4-FFF2-40B4-BE49-F238E27FC236}">
+                <a16:creationId xmlns:a16="http://schemas.microsoft.com/office/drawing/2014/main" id="{932AD993-2A8B-2A3A-1449-672DF98574C1}"/>
+              </a:ext>
+            </a:extLst>
+          </p:cNvPr>
+          <p:cNvPicPr>
+            <a:picLocks noChangeAspect="1"/>
+          </p:cNvPicPr>
+          <p:nvPr/>
+        </p:nvPicPr>
+        <p:blipFill rotWithShape="1">
+          <a:blip r:embed="rId8"/>
+          <a:srcRect b="35607"/>
+          <a:stretch/>
+        </p:blipFill>
+        <p:spPr>
+          <a:xfrm>
+            <a:off x="709730" y="4418089"/>
+            <a:ext cx="580691" cy="432092"/>
+          </a:xfrm>
+          <a:prstGeom prst="rect">
+            <a:avLst/>
+          </a:prstGeom>
+        </p:spPr>
+      </p:pic>
+      <p:pic>
+        <p:nvPicPr>
+          <p:cNvPr id="36" name="Picture 35">
+            <a:extLst>
+              <a:ext uri="{FF2B5EF4-FFF2-40B4-BE49-F238E27FC236}">
+                <a16:creationId xmlns:a16="http://schemas.microsoft.com/office/drawing/2014/main" id="{35A356D3-B654-E3D5-26E1-F376A0A6D7CB}"/>
+              </a:ext>
+            </a:extLst>
+          </p:cNvPr>
+          <p:cNvPicPr>
+            <a:picLocks noChangeAspect="1"/>
+          </p:cNvPicPr>
+          <p:nvPr/>
+        </p:nvPicPr>
+        <p:blipFill>
+          <a:blip r:embed="rId9"/>
+          <a:stretch>
+            <a:fillRect/>
+          </a:stretch>
+        </p:blipFill>
+        <p:spPr>
+          <a:xfrm>
+            <a:off x="1485625" y="3116484"/>
+            <a:ext cx="433904" cy="473350"/>
+          </a:xfrm>
+          <a:prstGeom prst="rect">
+            <a:avLst/>
+          </a:prstGeom>
+        </p:spPr>
+      </p:pic>
+      <p:pic>
+        <p:nvPicPr>
+          <p:cNvPr id="38" name="Picture 37">
+            <a:extLst>
+              <a:ext uri="{FF2B5EF4-FFF2-40B4-BE49-F238E27FC236}">
+                <a16:creationId xmlns:a16="http://schemas.microsoft.com/office/drawing/2014/main" id="{AC074975-7A02-D62C-4967-695DB5A51BC5}"/>
+              </a:ext>
+            </a:extLst>
+          </p:cNvPr>
+          <p:cNvPicPr>
+            <a:picLocks noChangeAspect="1"/>
+          </p:cNvPicPr>
+          <p:nvPr/>
+        </p:nvPicPr>
+        <p:blipFill>
+          <a:blip r:embed="rId10"/>
+          <a:stretch>
+            <a:fillRect/>
+          </a:stretch>
+        </p:blipFill>
+        <p:spPr>
+          <a:xfrm>
+            <a:off x="709730" y="3083775"/>
+            <a:ext cx="516849" cy="485524"/>
+          </a:xfrm>
+          <a:prstGeom prst="rect">
+            <a:avLst/>
+          </a:prstGeom>
+        </p:spPr>
+      </p:pic>
+      <p:sp>
+        <p:nvSpPr>
+          <p:cNvPr id="40" name="TextBox 39">
+            <a:extLst>
+              <a:ext uri="{FF2B5EF4-FFF2-40B4-BE49-F238E27FC236}">
+                <a16:creationId xmlns:a16="http://schemas.microsoft.com/office/drawing/2014/main" id="{6838A613-FC02-3FB4-BA30-CB3EF9FA9E00}"/>
+              </a:ext>
+            </a:extLst>
+          </p:cNvPr>
+          <p:cNvSpPr txBox="1"/>
+          <p:nvPr/>
+        </p:nvSpPr>
+        <p:spPr>
+          <a:xfrm>
+            <a:off x="668562" y="3544036"/>
+            <a:ext cx="575734" cy="276999"/>
+          </a:xfrm>
+          <a:prstGeom prst="rect">
+            <a:avLst/>
+          </a:prstGeom>
+          <a:noFill/>
+        </p:spPr>
+        <p:txBody>
+          <a:bodyPr wrap="square" rtlCol="0">
+            <a:spAutoFit/>
+          </a:bodyPr>
+          <a:lstStyle/>
+          <a:p>
+            <a:r>
+              <a:rPr lang="en-US" sz="1200" dirty="0">
+                <a:solidFill>
+                  <a:srgbClr val="002060"/>
+                </a:solidFill>
+              </a:rPr>
+              <a:t>Email</a:t>
+            </a:r>
+          </a:p>
+        </p:txBody>
+      </p:sp>
+      <p:sp>
+        <p:nvSpPr>
+          <p:cNvPr id="41" name="TextBox 40">
+            <a:extLst>
+              <a:ext uri="{FF2B5EF4-FFF2-40B4-BE49-F238E27FC236}">
+                <a16:creationId xmlns:a16="http://schemas.microsoft.com/office/drawing/2014/main" id="{3ECC6192-D7CF-6DDD-F8D5-C424A64B20AB}"/>
+              </a:ext>
+            </a:extLst>
+          </p:cNvPr>
+          <p:cNvSpPr txBox="1"/>
+          <p:nvPr/>
+        </p:nvSpPr>
+        <p:spPr>
+          <a:xfrm>
+            <a:off x="1307083" y="3544036"/>
+            <a:ext cx="931387" cy="276999"/>
+          </a:xfrm>
+          <a:prstGeom prst="rect">
+            <a:avLst/>
+          </a:prstGeom>
+          <a:noFill/>
+        </p:spPr>
+        <p:txBody>
+          <a:bodyPr wrap="square" rtlCol="0">
+            <a:spAutoFit/>
+          </a:bodyPr>
+          <a:lstStyle/>
+          <a:p>
+            <a:r>
+              <a:rPr lang="en-US" sz="1200" dirty="0">
+                <a:solidFill>
+                  <a:srgbClr val="002060"/>
+                </a:solidFill>
+              </a:rPr>
+              <a:t>Document</a:t>
+            </a:r>
+          </a:p>
+        </p:txBody>
+      </p:sp>
+      <p:sp>
+        <p:nvSpPr>
+          <p:cNvPr id="42" name="TextBox 41">
+            <a:extLst>
+              <a:ext uri="{FF2B5EF4-FFF2-40B4-BE49-F238E27FC236}">
+                <a16:creationId xmlns:a16="http://schemas.microsoft.com/office/drawing/2014/main" id="{1ABA0F5A-8158-07F1-76EE-BDD6D054BB21}"/>
+              </a:ext>
+            </a:extLst>
+          </p:cNvPr>
+          <p:cNvSpPr txBox="1"/>
+          <p:nvPr/>
+        </p:nvSpPr>
+        <p:spPr>
+          <a:xfrm>
+            <a:off x="680814" y="4152449"/>
+            <a:ext cx="638521" cy="276999"/>
+          </a:xfrm>
+          <a:prstGeom prst="rect">
+            <a:avLst/>
+          </a:prstGeom>
+          <a:noFill/>
+        </p:spPr>
+        <p:txBody>
+          <a:bodyPr wrap="square" rtlCol="0">
+            <a:spAutoFit/>
+          </a:bodyPr>
+          <a:lstStyle/>
+          <a:p>
+            <a:r>
+              <a:rPr lang="en-US" sz="1200" dirty="0">
+                <a:solidFill>
+                  <a:srgbClr val="002060"/>
+                </a:solidFill>
+              </a:rPr>
+              <a:t>Image</a:t>
+            </a:r>
+          </a:p>
+        </p:txBody>
+      </p:sp>
+      <p:sp>
+        <p:nvSpPr>
+          <p:cNvPr id="43" name="TextBox 42">
+            <a:extLst>
+              <a:ext uri="{FF2B5EF4-FFF2-40B4-BE49-F238E27FC236}">
+                <a16:creationId xmlns:a16="http://schemas.microsoft.com/office/drawing/2014/main" id="{B467F503-5AF4-97F7-BFA0-DDCE9E71767C}"/>
+              </a:ext>
+            </a:extLst>
+          </p:cNvPr>
+          <p:cNvSpPr txBox="1"/>
+          <p:nvPr/>
+        </p:nvSpPr>
+        <p:spPr>
+          <a:xfrm>
+            <a:off x="1443328" y="4152449"/>
+            <a:ext cx="595642" cy="276999"/>
+          </a:xfrm>
+          <a:prstGeom prst="rect">
+            <a:avLst/>
+          </a:prstGeom>
+          <a:noFill/>
+        </p:spPr>
+        <p:txBody>
+          <a:bodyPr wrap="square" rtlCol="0">
+            <a:spAutoFit/>
+          </a:bodyPr>
+          <a:lstStyle/>
+          <a:p>
+            <a:r>
+              <a:rPr lang="en-US" sz="1200" dirty="0">
+                <a:solidFill>
+                  <a:srgbClr val="002060"/>
+                </a:solidFill>
+              </a:rPr>
+              <a:t>Video</a:t>
+            </a:r>
+          </a:p>
+        </p:txBody>
+      </p:sp>
+      <p:sp>
+        <p:nvSpPr>
+          <p:cNvPr id="44" name="TextBox 43">
+            <a:extLst>
+              <a:ext uri="{FF2B5EF4-FFF2-40B4-BE49-F238E27FC236}">
+                <a16:creationId xmlns:a16="http://schemas.microsoft.com/office/drawing/2014/main" id="{764D6A06-4212-74F1-C5C8-1269E3684F55}"/>
+              </a:ext>
+            </a:extLst>
+          </p:cNvPr>
+          <p:cNvSpPr txBox="1"/>
+          <p:nvPr/>
+        </p:nvSpPr>
+        <p:spPr>
+          <a:xfrm>
+            <a:off x="742724" y="4850413"/>
+            <a:ext cx="575734" cy="276999"/>
+          </a:xfrm>
+          <a:prstGeom prst="rect">
+            <a:avLst/>
+          </a:prstGeom>
+          <a:noFill/>
+        </p:spPr>
+        <p:txBody>
+          <a:bodyPr wrap="square" rtlCol="0">
+            <a:spAutoFit/>
+          </a:bodyPr>
+          <a:lstStyle/>
+          <a:p>
+            <a:r>
+              <a:rPr lang="en-US" sz="1200" dirty="0">
+                <a:solidFill>
+                  <a:srgbClr val="002060"/>
+                </a:solidFill>
+              </a:rPr>
+              <a:t>Form</a:t>
+            </a:r>
+          </a:p>
+        </p:txBody>
+      </p:sp>
+      <p:sp>
+        <p:nvSpPr>
+          <p:cNvPr id="45" name="TextBox 44">
+            <a:extLst>
+              <a:ext uri="{FF2B5EF4-FFF2-40B4-BE49-F238E27FC236}">
+                <a16:creationId xmlns:a16="http://schemas.microsoft.com/office/drawing/2014/main" id="{AE9E709C-5FDC-3D8E-48B7-3A9710C33A80}"/>
+              </a:ext>
+            </a:extLst>
+          </p:cNvPr>
+          <p:cNvSpPr txBox="1"/>
+          <p:nvPr/>
+        </p:nvSpPr>
+        <p:spPr>
+          <a:xfrm>
+            <a:off x="1403132" y="4850413"/>
+            <a:ext cx="595642" cy="276999"/>
+          </a:xfrm>
+          <a:prstGeom prst="rect">
+            <a:avLst/>
+          </a:prstGeom>
+          <a:noFill/>
+        </p:spPr>
+        <p:txBody>
+          <a:bodyPr wrap="square" rtlCol="0">
+            <a:spAutoFit/>
+          </a:bodyPr>
+          <a:lstStyle/>
+          <a:p>
+            <a:r>
+              <a:rPr lang="en-US" sz="1200" dirty="0">
+                <a:solidFill>
+                  <a:srgbClr val="002060"/>
+                </a:solidFill>
+              </a:rPr>
+              <a:t>Audio</a:t>
+            </a:r>
+          </a:p>
+        </p:txBody>
+      </p:sp>
     </p:spTree>
     <p:extLst>
       <p:ext uri="{BB962C8B-B14F-4D97-AF65-F5344CB8AC3E}">
@@ -15570,7 +16087,7 @@
         </p:blipFill>
         <p:spPr>
           <a:xfrm>
-            <a:off x="240999" y="500369"/>
+            <a:off x="240999" y="358365"/>
             <a:ext cx="5855001" cy="4915153"/>
           </a:xfrm>
           <a:prstGeom prst="rect">

</xml_diff>

<commit_message>
Adding the email sender for demo
</commit_message>
<xml_diff>
--- a/DocAI-Architecture.pptx
+++ b/DocAI-Architecture.pptx
@@ -5,7 +5,7 @@
     <p:sldMasterId id="2147483648" r:id="rId1"/>
   </p:sldMasterIdLst>
   <p:notesMasterIdLst>
-    <p:notesMasterId r:id="rId9"/>
+    <p:notesMasterId r:id="rId11"/>
   </p:notesMasterIdLst>
   <p:sldIdLst>
     <p:sldId id="261" r:id="rId2"/>
@@ -15,6 +15,8 @@
     <p:sldId id="259" r:id="rId6"/>
     <p:sldId id="260" r:id="rId7"/>
     <p:sldId id="262" r:id="rId8"/>
+    <p:sldId id="265" r:id="rId9"/>
+    <p:sldId id="264" r:id="rId10"/>
   </p:sldIdLst>
   <p:sldSz cx="12192000" cy="6858000"/>
   <p:notesSz cx="6858000" cy="9144000"/>
@@ -124,7 +126,7 @@
 <file path=ppt/revisionInfo.xml><?xml version="1.0" encoding="utf-8"?>
 <p1510:revInfo xmlns:a="http://schemas.openxmlformats.org/drawingml/2006/main" xmlns:r="http://schemas.openxmlformats.org/officeDocument/2006/relationships" xmlns:p1510="http://schemas.microsoft.com/office/powerpoint/2015/10/main">
   <p1510:revLst>
-    <p1510:client id="{F9D43E7F-1D27-45AD-A9EF-7BAB61DCB54E}" v="108" dt="2024-01-23T21:26:18.416"/>
+    <p1510:client id="{F9D43E7F-1D27-45AD-A9EF-7BAB61DCB54E}" v="116" dt="2024-02-07T18:26:09.091"/>
   </p1510:revLst>
 </p1510:revInfo>
 </file>
@@ -134,7 +136,7 @@
   <pc:docChgLst>
     <pc:chgData name="Tirthankar Barari (TR)" userId="e41d4ef3-c9c5-4f08-a494-4c3cb9d953aa" providerId="ADAL" clId="{F9D43E7F-1D27-45AD-A9EF-7BAB61DCB54E}"/>
     <pc:docChg chg="undo redo custSel addSld delSld modSld sldOrd">
-      <pc:chgData name="Tirthankar Barari (TR)" userId="e41d4ef3-c9c5-4f08-a494-4c3cb9d953aa" providerId="ADAL" clId="{F9D43E7F-1D27-45AD-A9EF-7BAB61DCB54E}" dt="2024-01-23T21:28:17.327" v="5096" actId="14100"/>
+      <pc:chgData name="Tirthankar Barari (TR)" userId="e41d4ef3-c9c5-4f08-a494-4c3cb9d953aa" providerId="ADAL" clId="{F9D43E7F-1D27-45AD-A9EF-7BAB61DCB54E}" dt="2024-02-16T15:30:21.277" v="5392" actId="21"/>
       <pc:docMkLst>
         <pc:docMk/>
       </pc:docMkLst>
@@ -7056,6 +7058,91 @@
             <pc:docMk/>
             <pc:sldMk cId="2762766482" sldId="262"/>
             <ac:picMk id="6" creationId="{254F6513-E135-89DF-462E-98094A8B16C9}"/>
+          </ac:picMkLst>
+        </pc:picChg>
+      </pc:sldChg>
+      <pc:sldChg chg="new del">
+        <pc:chgData name="Tirthankar Barari (TR)" userId="e41d4ef3-c9c5-4f08-a494-4c3cb9d953aa" providerId="ADAL" clId="{F9D43E7F-1D27-45AD-A9EF-7BAB61DCB54E}" dt="2024-02-07T17:06:56.869" v="5101" actId="2696"/>
+        <pc:sldMkLst>
+          <pc:docMk/>
+          <pc:sldMk cId="4181282634" sldId="263"/>
+        </pc:sldMkLst>
+      </pc:sldChg>
+      <pc:sldChg chg="delSp modSp add mod ord">
+        <pc:chgData name="Tirthankar Barari (TR)" userId="e41d4ef3-c9c5-4f08-a494-4c3cb9d953aa" providerId="ADAL" clId="{F9D43E7F-1D27-45AD-A9EF-7BAB61DCB54E}" dt="2024-02-07T17:56:43.757" v="5384" actId="6549"/>
+        <pc:sldMkLst>
+          <pc:docMk/>
+          <pc:sldMk cId="3075574753" sldId="264"/>
+        </pc:sldMkLst>
+        <pc:spChg chg="mod">
+          <ac:chgData name="Tirthankar Barari (TR)" userId="e41d4ef3-c9c5-4f08-a494-4c3cb9d953aa" providerId="ADAL" clId="{F9D43E7F-1D27-45AD-A9EF-7BAB61DCB54E}" dt="2024-02-07T17:07:02.695" v="5111" actId="20577"/>
+          <ac:spMkLst>
+            <pc:docMk/>
+            <pc:sldMk cId="3075574753" sldId="264"/>
+            <ac:spMk id="2" creationId="{87507EF3-028B-4307-51FF-73982DD3C29A}"/>
+          </ac:spMkLst>
+        </pc:spChg>
+        <pc:spChg chg="mod">
+          <ac:chgData name="Tirthankar Barari (TR)" userId="e41d4ef3-c9c5-4f08-a494-4c3cb9d953aa" providerId="ADAL" clId="{F9D43E7F-1D27-45AD-A9EF-7BAB61DCB54E}" dt="2024-02-07T17:56:43.757" v="5384" actId="6549"/>
+          <ac:spMkLst>
+            <pc:docMk/>
+            <pc:sldMk cId="3075574753" sldId="264"/>
+            <ac:spMk id="4" creationId="{4C1129DB-50E0-47A8-5BDC-0DDE4F408E1E}"/>
+          </ac:spMkLst>
+        </pc:spChg>
+        <pc:spChg chg="del">
+          <ac:chgData name="Tirthankar Barari (TR)" userId="e41d4ef3-c9c5-4f08-a494-4c3cb9d953aa" providerId="ADAL" clId="{F9D43E7F-1D27-45AD-A9EF-7BAB61DCB54E}" dt="2024-02-07T17:07:09.489" v="5112" actId="478"/>
+          <ac:spMkLst>
+            <pc:docMk/>
+            <pc:sldMk cId="3075574753" sldId="264"/>
+            <ac:spMk id="5" creationId="{C8D8E12D-BE14-6A86-1D64-33D59323DD5C}"/>
+          </ac:spMkLst>
+        </pc:spChg>
+      </pc:sldChg>
+      <pc:sldChg chg="addSp delSp modSp new mod setBg">
+        <pc:chgData name="Tirthankar Barari (TR)" userId="e41d4ef3-c9c5-4f08-a494-4c3cb9d953aa" providerId="ADAL" clId="{F9D43E7F-1D27-45AD-A9EF-7BAB61DCB54E}" dt="2024-02-16T15:30:21.277" v="5392" actId="21"/>
+        <pc:sldMkLst>
+          <pc:docMk/>
+          <pc:sldMk cId="476166783" sldId="265"/>
+        </pc:sldMkLst>
+        <pc:spChg chg="del">
+          <ac:chgData name="Tirthankar Barari (TR)" userId="e41d4ef3-c9c5-4f08-a494-4c3cb9d953aa" providerId="ADAL" clId="{F9D43E7F-1D27-45AD-A9EF-7BAB61DCB54E}" dt="2024-02-16T15:25:19.518" v="5386" actId="478"/>
+          <ac:spMkLst>
+            <pc:docMk/>
+            <pc:sldMk cId="476166783" sldId="265"/>
+            <ac:spMk id="2" creationId="{07616548-6120-DBE0-9F50-40E031A432DD}"/>
+          </ac:spMkLst>
+        </pc:spChg>
+        <pc:spChg chg="del">
+          <ac:chgData name="Tirthankar Barari (TR)" userId="e41d4ef3-c9c5-4f08-a494-4c3cb9d953aa" providerId="ADAL" clId="{F9D43E7F-1D27-45AD-A9EF-7BAB61DCB54E}" dt="2024-02-16T15:25:23.598" v="5388" actId="478"/>
+          <ac:spMkLst>
+            <pc:docMk/>
+            <pc:sldMk cId="476166783" sldId="265"/>
+            <ac:spMk id="3" creationId="{AAAC103D-6E6A-F6AC-A344-34F6634EBB49}"/>
+          </ac:spMkLst>
+        </pc:spChg>
+        <pc:spChg chg="del">
+          <ac:chgData name="Tirthankar Barari (TR)" userId="e41d4ef3-c9c5-4f08-a494-4c3cb9d953aa" providerId="ADAL" clId="{F9D43E7F-1D27-45AD-A9EF-7BAB61DCB54E}" dt="2024-02-16T15:25:21.967" v="5387" actId="478"/>
+          <ac:spMkLst>
+            <pc:docMk/>
+            <pc:sldMk cId="476166783" sldId="265"/>
+            <ac:spMk id="4" creationId="{3F432CA4-5330-6EA7-E667-7A69A2B63831}"/>
+          </ac:spMkLst>
+        </pc:spChg>
+        <pc:spChg chg="add">
+          <ac:chgData name="Tirthankar Barari (TR)" userId="e41d4ef3-c9c5-4f08-a494-4c3cb9d953aa" providerId="ADAL" clId="{F9D43E7F-1D27-45AD-A9EF-7BAB61DCB54E}" dt="2024-02-16T15:25:30.772" v="5390" actId="26606"/>
+          <ac:spMkLst>
+            <pc:docMk/>
+            <pc:sldMk cId="476166783" sldId="265"/>
+            <ac:spMk id="11" creationId="{42A4FC2C-047E-45A5-965D-8E1E3BF09BC6}"/>
+          </ac:spMkLst>
+        </pc:spChg>
+        <pc:picChg chg="add del mod">
+          <ac:chgData name="Tirthankar Barari (TR)" userId="e41d4ef3-c9c5-4f08-a494-4c3cb9d953aa" providerId="ADAL" clId="{F9D43E7F-1D27-45AD-A9EF-7BAB61DCB54E}" dt="2024-02-16T15:30:21.277" v="5392" actId="21"/>
+          <ac:picMkLst>
+            <pc:docMk/>
+            <pc:sldMk cId="476166783" sldId="265"/>
+            <ac:picMk id="6" creationId="{1DDD004E-2AC9-B7A7-FAD6-06EEAB65C045}"/>
           </ac:picMkLst>
         </pc:picChg>
       </pc:sldChg>
@@ -7146,7 +7233,7 @@
           <a:p>
             <a:fld id="{2597F8CA-C0D6-46E1-BE92-BE44C33ECD60}" type="datetimeFigureOut">
               <a:rPr lang="en-US" smtClean="0"/>
-              <a:t>1/23/2024</a:t>
+              <a:t>2/15/2024</a:t>
             </a:fld>
             <a:endParaRPr lang="en-US"/>
           </a:p>
@@ -8220,6 +8307,198 @@
 </p:notes>
 </file>
 
+<file path=ppt/notesSlides/notesSlide8.xml><?xml version="1.0" encoding="utf-8"?>
+<p:notes xmlns:a="http://schemas.openxmlformats.org/drawingml/2006/main" xmlns:r="http://schemas.openxmlformats.org/officeDocument/2006/relationships" xmlns:p="http://schemas.openxmlformats.org/presentationml/2006/main">
+  <p:cSld>
+    <p:spTree>
+      <p:nvGrpSpPr>
+        <p:cNvPr id="1" name=""/>
+        <p:cNvGrpSpPr/>
+        <p:nvPr/>
+      </p:nvGrpSpPr>
+      <p:grpSpPr>
+        <a:xfrm>
+          <a:off x="0" y="0"/>
+          <a:ext cx="0" cy="0"/>
+          <a:chOff x="0" y="0"/>
+          <a:chExt cx="0" cy="0"/>
+        </a:xfrm>
+      </p:grpSpPr>
+      <p:sp>
+        <p:nvSpPr>
+          <p:cNvPr id="2" name="Slide Image Placeholder 1"/>
+          <p:cNvSpPr>
+            <a:spLocks noGrp="1" noRot="1" noChangeAspect="1"/>
+          </p:cNvSpPr>
+          <p:nvPr>
+            <p:ph type="sldImg"/>
+          </p:nvPr>
+        </p:nvSpPr>
+        <p:spPr/>
+      </p:sp>
+      <p:sp>
+        <p:nvSpPr>
+          <p:cNvPr id="3" name="Notes Placeholder 2"/>
+          <p:cNvSpPr>
+            <a:spLocks noGrp="1"/>
+          </p:cNvSpPr>
+          <p:nvPr>
+            <p:ph type="body" idx="1"/>
+          </p:nvPr>
+        </p:nvSpPr>
+        <p:spPr/>
+        <p:txBody>
+          <a:bodyPr/>
+          <a:lstStyle/>
+          <a:p>
+            <a:endParaRPr lang="en-US" dirty="0"/>
+          </a:p>
+        </p:txBody>
+      </p:sp>
+      <p:sp>
+        <p:nvSpPr>
+          <p:cNvPr id="4" name="Slide Number Placeholder 3"/>
+          <p:cNvSpPr>
+            <a:spLocks noGrp="1"/>
+          </p:cNvSpPr>
+          <p:nvPr>
+            <p:ph type="sldNum" sz="quarter" idx="5"/>
+          </p:nvPr>
+        </p:nvSpPr>
+        <p:spPr/>
+        <p:txBody>
+          <a:bodyPr/>
+          <a:lstStyle/>
+          <a:p>
+            <a:fld id="{12D7AEA8-F1A2-441E-B893-7342A4418BB5}" type="slidenum">
+              <a:rPr lang="en-US" smtClean="0"/>
+              <a:t>8</a:t>
+            </a:fld>
+            <a:endParaRPr lang="en-US"/>
+          </a:p>
+        </p:txBody>
+      </p:sp>
+    </p:spTree>
+    <p:extLst>
+      <p:ext uri="{BB962C8B-B14F-4D97-AF65-F5344CB8AC3E}">
+        <p14:creationId xmlns:p14="http://schemas.microsoft.com/office/powerpoint/2010/main" val="2113167720"/>
+      </p:ext>
+    </p:extLst>
+  </p:cSld>
+  <p:clrMapOvr>
+    <a:masterClrMapping/>
+  </p:clrMapOvr>
+</p:notes>
+</file>
+
+<file path=ppt/notesSlides/notesSlide9.xml><?xml version="1.0" encoding="utf-8"?>
+<p:notes xmlns:a="http://schemas.openxmlformats.org/drawingml/2006/main" xmlns:r="http://schemas.openxmlformats.org/officeDocument/2006/relationships" xmlns:p="http://schemas.openxmlformats.org/presentationml/2006/main">
+  <p:cSld>
+    <p:spTree>
+      <p:nvGrpSpPr>
+        <p:cNvPr id="1" name="">
+          <a:extLst>
+            <a:ext uri="{FF2B5EF4-FFF2-40B4-BE49-F238E27FC236}">
+              <a16:creationId xmlns:a16="http://schemas.microsoft.com/office/drawing/2014/main" id="{8CEF161F-ED92-68CC-8DB1-3BD92DC288A8}"/>
+            </a:ext>
+          </a:extLst>
+        </p:cNvPr>
+        <p:cNvGrpSpPr/>
+        <p:nvPr/>
+      </p:nvGrpSpPr>
+      <p:grpSpPr>
+        <a:xfrm>
+          <a:off x="0" y="0"/>
+          <a:ext cx="0" cy="0"/>
+          <a:chOff x="0" y="0"/>
+          <a:chExt cx="0" cy="0"/>
+        </a:xfrm>
+      </p:grpSpPr>
+      <p:sp>
+        <p:nvSpPr>
+          <p:cNvPr id="2" name="Slide Image Placeholder 1">
+            <a:extLst>
+              <a:ext uri="{FF2B5EF4-FFF2-40B4-BE49-F238E27FC236}">
+                <a16:creationId xmlns:a16="http://schemas.microsoft.com/office/drawing/2014/main" id="{2361B8BC-F4D7-E089-DA34-90A8958C741C}"/>
+              </a:ext>
+            </a:extLst>
+          </p:cNvPr>
+          <p:cNvSpPr>
+            <a:spLocks noGrp="1" noRot="1" noChangeAspect="1"/>
+          </p:cNvSpPr>
+          <p:nvPr>
+            <p:ph type="sldImg"/>
+          </p:nvPr>
+        </p:nvSpPr>
+        <p:spPr/>
+      </p:sp>
+      <p:sp>
+        <p:nvSpPr>
+          <p:cNvPr id="3" name="Notes Placeholder 2">
+            <a:extLst>
+              <a:ext uri="{FF2B5EF4-FFF2-40B4-BE49-F238E27FC236}">
+                <a16:creationId xmlns:a16="http://schemas.microsoft.com/office/drawing/2014/main" id="{4B043CFE-ED1E-7ECF-B14A-18DA648B1C44}"/>
+              </a:ext>
+            </a:extLst>
+          </p:cNvPr>
+          <p:cNvSpPr>
+            <a:spLocks noGrp="1"/>
+          </p:cNvSpPr>
+          <p:nvPr>
+            <p:ph type="body" idx="1"/>
+          </p:nvPr>
+        </p:nvSpPr>
+        <p:spPr/>
+        <p:txBody>
+          <a:bodyPr/>
+          <a:lstStyle/>
+          <a:p>
+            <a:endParaRPr lang="en-US" dirty="0"/>
+          </a:p>
+        </p:txBody>
+      </p:sp>
+      <p:sp>
+        <p:nvSpPr>
+          <p:cNvPr id="4" name="Slide Number Placeholder 3">
+            <a:extLst>
+              <a:ext uri="{FF2B5EF4-FFF2-40B4-BE49-F238E27FC236}">
+                <a16:creationId xmlns:a16="http://schemas.microsoft.com/office/drawing/2014/main" id="{8ADAF9D4-F73D-102D-0C2A-4897C0BF13E1}"/>
+              </a:ext>
+            </a:extLst>
+          </p:cNvPr>
+          <p:cNvSpPr>
+            <a:spLocks noGrp="1"/>
+          </p:cNvSpPr>
+          <p:nvPr>
+            <p:ph type="sldNum" sz="quarter" idx="5"/>
+          </p:nvPr>
+        </p:nvSpPr>
+        <p:spPr/>
+        <p:txBody>
+          <a:bodyPr/>
+          <a:lstStyle/>
+          <a:p>
+            <a:fld id="{12D7AEA8-F1A2-441E-B893-7342A4418BB5}" type="slidenum">
+              <a:rPr lang="en-US" smtClean="0"/>
+              <a:t>9</a:t>
+            </a:fld>
+            <a:endParaRPr lang="en-US"/>
+          </a:p>
+        </p:txBody>
+      </p:sp>
+    </p:spTree>
+    <p:extLst>
+      <p:ext uri="{BB962C8B-B14F-4D97-AF65-F5344CB8AC3E}">
+        <p14:creationId xmlns:p14="http://schemas.microsoft.com/office/powerpoint/2010/main" val="881888386"/>
+      </p:ext>
+    </p:extLst>
+  </p:cSld>
+  <p:clrMapOvr>
+    <a:masterClrMapping/>
+  </p:clrMapOvr>
+</p:notes>
+</file>
+
 <file path=ppt/slideLayouts/slideLayout1.xml><?xml version="1.0" encoding="utf-8"?>
 <p:sldLayout xmlns:a="http://schemas.openxmlformats.org/drawingml/2006/main" xmlns:r="http://schemas.openxmlformats.org/officeDocument/2006/relationships" xmlns:p="http://schemas.openxmlformats.org/presentationml/2006/main" type="title" preserve="1">
   <p:cSld name="Title Slide">
@@ -8367,7 +8646,7 @@
           <a:p>
             <a:fld id="{46A9F2F8-7B6D-46B7-8E68-D723B59E620F}" type="datetimeFigureOut">
               <a:rPr lang="en-US" smtClean="0"/>
-              <a:t>1/23/2024</a:t>
+              <a:t>2/15/2024</a:t>
             </a:fld>
             <a:endParaRPr lang="en-US"/>
           </a:p>
@@ -8565,7 +8844,7 @@
           <a:p>
             <a:fld id="{46A9F2F8-7B6D-46B7-8E68-D723B59E620F}" type="datetimeFigureOut">
               <a:rPr lang="en-US" smtClean="0"/>
-              <a:t>1/23/2024</a:t>
+              <a:t>2/15/2024</a:t>
             </a:fld>
             <a:endParaRPr lang="en-US"/>
           </a:p>
@@ -8773,7 +9052,7 @@
           <a:p>
             <a:fld id="{46A9F2F8-7B6D-46B7-8E68-D723B59E620F}" type="datetimeFigureOut">
               <a:rPr lang="en-US" smtClean="0"/>
-              <a:t>1/23/2024</a:t>
+              <a:t>2/15/2024</a:t>
             </a:fld>
             <a:endParaRPr lang="en-US"/>
           </a:p>
@@ -8971,7 +9250,7 @@
           <a:p>
             <a:fld id="{46A9F2F8-7B6D-46B7-8E68-D723B59E620F}" type="datetimeFigureOut">
               <a:rPr lang="en-US" smtClean="0"/>
-              <a:t>1/23/2024</a:t>
+              <a:t>2/15/2024</a:t>
             </a:fld>
             <a:endParaRPr lang="en-US"/>
           </a:p>
@@ -9246,7 +9525,7 @@
           <a:p>
             <a:fld id="{46A9F2F8-7B6D-46B7-8E68-D723B59E620F}" type="datetimeFigureOut">
               <a:rPr lang="en-US" smtClean="0"/>
-              <a:t>1/23/2024</a:t>
+              <a:t>2/15/2024</a:t>
             </a:fld>
             <a:endParaRPr lang="en-US"/>
           </a:p>
@@ -9511,7 +9790,7 @@
           <a:p>
             <a:fld id="{46A9F2F8-7B6D-46B7-8E68-D723B59E620F}" type="datetimeFigureOut">
               <a:rPr lang="en-US" smtClean="0"/>
-              <a:t>1/23/2024</a:t>
+              <a:t>2/15/2024</a:t>
             </a:fld>
             <a:endParaRPr lang="en-US"/>
           </a:p>
@@ -9923,7 +10202,7 @@
           <a:p>
             <a:fld id="{46A9F2F8-7B6D-46B7-8E68-D723B59E620F}" type="datetimeFigureOut">
               <a:rPr lang="en-US" smtClean="0"/>
-              <a:t>1/23/2024</a:t>
+              <a:t>2/15/2024</a:t>
             </a:fld>
             <a:endParaRPr lang="en-US"/>
           </a:p>
@@ -10064,7 +10343,7 @@
           <a:p>
             <a:fld id="{46A9F2F8-7B6D-46B7-8E68-D723B59E620F}" type="datetimeFigureOut">
               <a:rPr lang="en-US" smtClean="0"/>
-              <a:t>1/23/2024</a:t>
+              <a:t>2/15/2024</a:t>
             </a:fld>
             <a:endParaRPr lang="en-US"/>
           </a:p>
@@ -10177,7 +10456,7 @@
           <a:p>
             <a:fld id="{46A9F2F8-7B6D-46B7-8E68-D723B59E620F}" type="datetimeFigureOut">
               <a:rPr lang="en-US" smtClean="0"/>
-              <a:t>1/23/2024</a:t>
+              <a:t>2/15/2024</a:t>
             </a:fld>
             <a:endParaRPr lang="en-US"/>
           </a:p>
@@ -10488,7 +10767,7 @@
           <a:p>
             <a:fld id="{46A9F2F8-7B6D-46B7-8E68-D723B59E620F}" type="datetimeFigureOut">
               <a:rPr lang="en-US" smtClean="0"/>
-              <a:t>1/23/2024</a:t>
+              <a:t>2/15/2024</a:t>
             </a:fld>
             <a:endParaRPr lang="en-US"/>
           </a:p>
@@ -10776,7 +11055,7 @@
           <a:p>
             <a:fld id="{46A9F2F8-7B6D-46B7-8E68-D723B59E620F}" type="datetimeFigureOut">
               <a:rPr lang="en-US" smtClean="0"/>
-              <a:t>1/23/2024</a:t>
+              <a:t>2/15/2024</a:t>
             </a:fld>
             <a:endParaRPr lang="en-US"/>
           </a:p>
@@ -11017,7 +11296,7 @@
           <a:p>
             <a:fld id="{46A9F2F8-7B6D-46B7-8E68-D723B59E620F}" type="datetimeFigureOut">
               <a:rPr lang="en-US" smtClean="0"/>
-              <a:t>1/23/2024</a:t>
+              <a:t>2/15/2024</a:t>
             </a:fld>
             <a:endParaRPr lang="en-US"/>
           </a:p>
@@ -17731,6 +18010,403 @@
 </p:sld>
 </file>
 
+<file path=ppt/slides/slide8.xml><?xml version="1.0" encoding="utf-8"?>
+<p:sld xmlns:a="http://schemas.openxmlformats.org/drawingml/2006/main" xmlns:r="http://schemas.openxmlformats.org/officeDocument/2006/relationships" xmlns:p="http://schemas.openxmlformats.org/presentationml/2006/main">
+  <p:cSld>
+    <p:bg>
+      <p:bgPr>
+        <a:solidFill>
+          <a:schemeClr val="bg1"/>
+        </a:solidFill>
+        <a:effectLst/>
+      </p:bgPr>
+    </p:bg>
+    <p:spTree>
+      <p:nvGrpSpPr>
+        <p:cNvPr id="1" name=""/>
+        <p:cNvGrpSpPr/>
+        <p:nvPr/>
+      </p:nvGrpSpPr>
+      <p:grpSpPr>
+        <a:xfrm>
+          <a:off x="0" y="0"/>
+          <a:ext cx="0" cy="0"/>
+          <a:chOff x="0" y="0"/>
+          <a:chExt cx="0" cy="0"/>
+        </a:xfrm>
+      </p:grpSpPr>
+      <p:sp>
+        <p:nvSpPr>
+          <p:cNvPr id="11" name="Rectangle 10">
+            <a:extLst>
+              <a:ext uri="{FF2B5EF4-FFF2-40B4-BE49-F238E27FC236}">
+                <a16:creationId xmlns:a16="http://schemas.microsoft.com/office/drawing/2014/main" id="{42A4FC2C-047E-45A5-965D-8E1E3BF09BC6}"/>
+              </a:ext>
+              <a:ext uri="{C183D7F6-B498-43B3-948B-1728B52AA6E4}">
+                <adec:decorative xmlns:adec="http://schemas.microsoft.com/office/drawing/2017/decorative" val="1"/>
+              </a:ext>
+            </a:extLst>
+          </p:cNvPr>
+          <p:cNvSpPr>
+            <a:spLocks noGrp="1" noRot="1" noChangeAspect="1" noMove="1" noResize="1" noEditPoints="1" noAdjustHandles="1" noChangeArrowheads="1" noChangeShapeType="1" noTextEdit="1"/>
+          </p:cNvSpPr>
+          <p:nvPr>
+            <p:extLst>
+              <p:ext uri="{386F3935-93C4-4BCD-93E2-E3B085C9AB24}">
+                <p16:designElem xmlns:p16="http://schemas.microsoft.com/office/powerpoint/2015/main" val="1"/>
+              </p:ext>
+            </p:extLst>
+          </p:nvPr>
+        </p:nvSpPr>
+        <p:spPr bwMode="white">
+          <a:xfrm>
+            <a:off x="1524" y="0"/>
+            <a:ext cx="12188952" cy="6858000"/>
+          </a:xfrm>
+          <a:prstGeom prst="rect">
+            <a:avLst/>
+          </a:prstGeom>
+          <a:noFill/>
+          <a:ln>
+            <a:noFill/>
+          </a:ln>
+        </p:spPr>
+        <p:style>
+          <a:lnRef idx="2">
+            <a:schemeClr val="accent1">
+              <a:shade val="50000"/>
+            </a:schemeClr>
+          </a:lnRef>
+          <a:fillRef idx="1">
+            <a:schemeClr val="accent1"/>
+          </a:fillRef>
+          <a:effectRef idx="0">
+            <a:schemeClr val="accent1"/>
+          </a:effectRef>
+          <a:fontRef idx="minor">
+            <a:schemeClr val="lt1"/>
+          </a:fontRef>
+        </p:style>
+        <p:txBody>
+          <a:bodyPr rtlCol="0" anchor="ctr"/>
+          <a:lstStyle>
+            <a:defPPr>
+              <a:defRPr lang="en-US"/>
+            </a:defPPr>
+            <a:lvl1pPr marL="0" algn="l" defTabSz="914400" rtl="0" eaLnBrk="1" latinLnBrk="0" hangingPunct="1">
+              <a:defRPr sz="1800" kern="1200">
+                <a:solidFill>
+                  <a:schemeClr val="lt1"/>
+                </a:solidFill>
+                <a:latin typeface="+mn-lt"/>
+                <a:ea typeface="+mn-ea"/>
+                <a:cs typeface="+mn-cs"/>
+              </a:defRPr>
+            </a:lvl1pPr>
+            <a:lvl2pPr marL="457200" algn="l" defTabSz="914400" rtl="0" eaLnBrk="1" latinLnBrk="0" hangingPunct="1">
+              <a:defRPr sz="1800" kern="1200">
+                <a:solidFill>
+                  <a:schemeClr val="lt1"/>
+                </a:solidFill>
+                <a:latin typeface="+mn-lt"/>
+                <a:ea typeface="+mn-ea"/>
+                <a:cs typeface="+mn-cs"/>
+              </a:defRPr>
+            </a:lvl2pPr>
+            <a:lvl3pPr marL="914400" algn="l" defTabSz="914400" rtl="0" eaLnBrk="1" latinLnBrk="0" hangingPunct="1">
+              <a:defRPr sz="1800" kern="1200">
+                <a:solidFill>
+                  <a:schemeClr val="lt1"/>
+                </a:solidFill>
+                <a:latin typeface="+mn-lt"/>
+                <a:ea typeface="+mn-ea"/>
+                <a:cs typeface="+mn-cs"/>
+              </a:defRPr>
+            </a:lvl3pPr>
+            <a:lvl4pPr marL="1371600" algn="l" defTabSz="914400" rtl="0" eaLnBrk="1" latinLnBrk="0" hangingPunct="1">
+              <a:defRPr sz="1800" kern="1200">
+                <a:solidFill>
+                  <a:schemeClr val="lt1"/>
+                </a:solidFill>
+                <a:latin typeface="+mn-lt"/>
+                <a:ea typeface="+mn-ea"/>
+                <a:cs typeface="+mn-cs"/>
+              </a:defRPr>
+            </a:lvl4pPr>
+            <a:lvl5pPr marL="1828800" algn="l" defTabSz="914400" rtl="0" eaLnBrk="1" latinLnBrk="0" hangingPunct="1">
+              <a:defRPr sz="1800" kern="1200">
+                <a:solidFill>
+                  <a:schemeClr val="lt1"/>
+                </a:solidFill>
+                <a:latin typeface="+mn-lt"/>
+                <a:ea typeface="+mn-ea"/>
+                <a:cs typeface="+mn-cs"/>
+              </a:defRPr>
+            </a:lvl5pPr>
+            <a:lvl6pPr marL="2286000" algn="l" defTabSz="914400" rtl="0" eaLnBrk="1" latinLnBrk="0" hangingPunct="1">
+              <a:defRPr sz="1800" kern="1200">
+                <a:solidFill>
+                  <a:schemeClr val="lt1"/>
+                </a:solidFill>
+                <a:latin typeface="+mn-lt"/>
+                <a:ea typeface="+mn-ea"/>
+                <a:cs typeface="+mn-cs"/>
+              </a:defRPr>
+            </a:lvl6pPr>
+            <a:lvl7pPr marL="2743200" algn="l" defTabSz="914400" rtl="0" eaLnBrk="1" latinLnBrk="0" hangingPunct="1">
+              <a:defRPr sz="1800" kern="1200">
+                <a:solidFill>
+                  <a:schemeClr val="lt1"/>
+                </a:solidFill>
+                <a:latin typeface="+mn-lt"/>
+                <a:ea typeface="+mn-ea"/>
+                <a:cs typeface="+mn-cs"/>
+              </a:defRPr>
+            </a:lvl7pPr>
+            <a:lvl8pPr marL="3200400" algn="l" defTabSz="914400" rtl="0" eaLnBrk="1" latinLnBrk="0" hangingPunct="1">
+              <a:defRPr sz="1800" kern="1200">
+                <a:solidFill>
+                  <a:schemeClr val="lt1"/>
+                </a:solidFill>
+                <a:latin typeface="+mn-lt"/>
+                <a:ea typeface="+mn-ea"/>
+                <a:cs typeface="+mn-cs"/>
+              </a:defRPr>
+            </a:lvl8pPr>
+            <a:lvl9pPr marL="3657600" algn="l" defTabSz="914400" rtl="0" eaLnBrk="1" latinLnBrk="0" hangingPunct="1">
+              <a:defRPr sz="1800" kern="1200">
+                <a:solidFill>
+                  <a:schemeClr val="lt1"/>
+                </a:solidFill>
+                <a:latin typeface="+mn-lt"/>
+                <a:ea typeface="+mn-ea"/>
+                <a:cs typeface="+mn-cs"/>
+              </a:defRPr>
+            </a:lvl9pPr>
+          </a:lstStyle>
+          <a:p>
+            <a:pPr algn="ctr"/>
+            <a:endParaRPr lang="en-US"/>
+          </a:p>
+        </p:txBody>
+      </p:sp>
+    </p:spTree>
+    <p:extLst>
+      <p:ext uri="{BB962C8B-B14F-4D97-AF65-F5344CB8AC3E}">
+        <p14:creationId xmlns:p14="http://schemas.microsoft.com/office/powerpoint/2010/main" val="476166783"/>
+      </p:ext>
+    </p:extLst>
+  </p:cSld>
+  <p:clrMapOvr>
+    <a:masterClrMapping/>
+  </p:clrMapOvr>
+</p:sld>
+</file>
+
+<file path=ppt/slides/slide9.xml><?xml version="1.0" encoding="utf-8"?>
+<p:sld xmlns:a="http://schemas.openxmlformats.org/drawingml/2006/main" xmlns:r="http://schemas.openxmlformats.org/officeDocument/2006/relationships" xmlns:p="http://schemas.openxmlformats.org/presentationml/2006/main">
+  <p:cSld>
+    <p:spTree>
+      <p:nvGrpSpPr>
+        <p:cNvPr id="1" name="">
+          <a:extLst>
+            <a:ext uri="{FF2B5EF4-FFF2-40B4-BE49-F238E27FC236}">
+              <a16:creationId xmlns:a16="http://schemas.microsoft.com/office/drawing/2014/main" id="{F363D9D6-B991-1DC6-D1AC-C55ECBC041F9}"/>
+            </a:ext>
+          </a:extLst>
+        </p:cNvPr>
+        <p:cNvGrpSpPr/>
+        <p:nvPr/>
+      </p:nvGrpSpPr>
+      <p:grpSpPr>
+        <a:xfrm>
+          <a:off x="0" y="0"/>
+          <a:ext cx="0" cy="0"/>
+          <a:chOff x="0" y="0"/>
+          <a:chExt cx="0" cy="0"/>
+        </a:xfrm>
+      </p:grpSpPr>
+      <p:sp>
+        <p:nvSpPr>
+          <p:cNvPr id="2" name="Title 1">
+            <a:extLst>
+              <a:ext uri="{FF2B5EF4-FFF2-40B4-BE49-F238E27FC236}">
+                <a16:creationId xmlns:a16="http://schemas.microsoft.com/office/drawing/2014/main" id="{87507EF3-028B-4307-51FF-73982DD3C29A}"/>
+              </a:ext>
+            </a:extLst>
+          </p:cNvPr>
+          <p:cNvSpPr>
+            <a:spLocks noGrp="1"/>
+          </p:cNvSpPr>
+          <p:nvPr>
+            <p:ph type="title"/>
+          </p:nvPr>
+        </p:nvSpPr>
+        <p:spPr>
+          <a:xfrm>
+            <a:off x="3302048" y="455612"/>
+            <a:ext cx="5587905" cy="533400"/>
+          </a:xfrm>
+        </p:spPr>
+        <p:txBody>
+          <a:bodyPr/>
+          <a:lstStyle/>
+          <a:p>
+            <a:pPr algn="ctr"/>
+            <a:r>
+              <a:rPr lang="en-US" dirty="0"/>
+              <a:t>References</a:t>
+            </a:r>
+          </a:p>
+        </p:txBody>
+      </p:sp>
+      <p:sp>
+        <p:nvSpPr>
+          <p:cNvPr id="4" name="Text Placeholder 3">
+            <a:extLst>
+              <a:ext uri="{FF2B5EF4-FFF2-40B4-BE49-F238E27FC236}">
+                <a16:creationId xmlns:a16="http://schemas.microsoft.com/office/drawing/2014/main" id="{4C1129DB-50E0-47A8-5BDC-0DDE4F408E1E}"/>
+              </a:ext>
+            </a:extLst>
+          </p:cNvPr>
+          <p:cNvSpPr>
+            <a:spLocks noGrp="1"/>
+          </p:cNvSpPr>
+          <p:nvPr>
+            <p:ph type="body" sz="half" idx="2"/>
+          </p:nvPr>
+        </p:nvSpPr>
+        <p:spPr>
+          <a:xfrm>
+            <a:off x="672964" y="1133474"/>
+            <a:ext cx="10846072" cy="4419601"/>
+          </a:xfrm>
+        </p:spPr>
+        <p:txBody>
+          <a:bodyPr>
+            <a:normAutofit/>
+          </a:bodyPr>
+          <a:lstStyle/>
+          <a:p>
+            <a:r>
+              <a:rPr lang="en-US" sz="1400" dirty="0">
+                <a:hlinkClick r:id="rId3"/>
+              </a:rPr>
+              <a:t>What’s new in Document Intelligence Service</a:t>
+            </a:r>
+            <a:endParaRPr lang="en-US" sz="1400" dirty="0"/>
+          </a:p>
+          <a:p>
+            <a:pPr marL="742950" lvl="1" indent="-285750">
+              <a:buFont typeface="Arial" panose="020B0604020202020204" pitchFamily="34" charset="0"/>
+              <a:buChar char="•"/>
+            </a:pPr>
+            <a:r>
+              <a:rPr lang="en-US" sz="1200" dirty="0">
+                <a:hlinkClick r:id="rId4"/>
+              </a:rPr>
+              <a:t>Query Fields</a:t>
+            </a:r>
+            <a:endParaRPr lang="en-US" sz="1200" dirty="0"/>
+          </a:p>
+          <a:p>
+            <a:pPr marL="742950" lvl="1" indent="-285750">
+              <a:buFont typeface="Arial" panose="020B0604020202020204" pitchFamily="34" charset="0"/>
+              <a:buChar char="•"/>
+            </a:pPr>
+            <a:r>
+              <a:rPr lang="en-US" sz="1200" dirty="0">
+                <a:hlinkClick r:id="rId5"/>
+              </a:rPr>
+              <a:t>Key Value Pair</a:t>
+            </a:r>
+            <a:endParaRPr lang="en-US" sz="1200" dirty="0"/>
+          </a:p>
+          <a:p>
+            <a:pPr marL="742950" lvl="1" indent="-285750">
+              <a:buFont typeface="Arial" panose="020B0604020202020204" pitchFamily="34" charset="0"/>
+              <a:buChar char="•"/>
+            </a:pPr>
+            <a:r>
+              <a:rPr lang="en-US" sz="1200" dirty="0">
+                <a:hlinkClick r:id="rId6"/>
+              </a:rPr>
+              <a:t>High Resolution Extraction</a:t>
+            </a:r>
+            <a:endParaRPr lang="en-US" sz="1200" dirty="0"/>
+          </a:p>
+          <a:p>
+            <a:pPr marL="742950" lvl="1" indent="-285750">
+              <a:buFont typeface="Arial" panose="020B0604020202020204" pitchFamily="34" charset="0"/>
+              <a:buChar char="•"/>
+            </a:pPr>
+            <a:r>
+              <a:rPr lang="en-US" sz="1200" dirty="0">
+                <a:hlinkClick r:id="rId7"/>
+              </a:rPr>
+              <a:t>Barcode</a:t>
+            </a:r>
+            <a:endParaRPr lang="en-US" sz="1200" dirty="0"/>
+          </a:p>
+          <a:p>
+            <a:pPr marL="742950" lvl="1" indent="-285750">
+              <a:buFont typeface="Arial" panose="020B0604020202020204" pitchFamily="34" charset="0"/>
+              <a:buChar char="•"/>
+            </a:pPr>
+            <a:r>
+              <a:rPr lang="en-US" sz="1200" dirty="0">
+                <a:hlinkClick r:id="rId8"/>
+              </a:rPr>
+              <a:t>Font Property Extraction</a:t>
+            </a:r>
+            <a:endParaRPr lang="en-US" sz="1200" dirty="0"/>
+          </a:p>
+          <a:p>
+            <a:pPr marL="742950" lvl="1" indent="-285750">
+              <a:buFont typeface="Arial" panose="020B0604020202020204" pitchFamily="34" charset="0"/>
+              <a:buChar char="•"/>
+            </a:pPr>
+            <a:r>
+              <a:rPr lang="en-US" sz="1200" dirty="0">
+                <a:hlinkClick r:id="rId9"/>
+              </a:rPr>
+              <a:t>Formula Extraction </a:t>
+            </a:r>
+            <a:r>
+              <a:rPr lang="en-US" sz="1200" dirty="0"/>
+              <a:t>(LaTeX representation as value)</a:t>
+            </a:r>
+          </a:p>
+          <a:p>
+            <a:r>
+              <a:rPr lang="en-US" sz="1400" dirty="0">
+                <a:hlinkClick r:id="rId10"/>
+              </a:rPr>
+              <a:t>AOAI with GPT-4 Vision API</a:t>
+            </a:r>
+            <a:endParaRPr lang="en-US" sz="1400" dirty="0"/>
+          </a:p>
+          <a:p>
+            <a:endParaRPr lang="en-US" sz="1400" dirty="0"/>
+          </a:p>
+          <a:p>
+            <a:endParaRPr lang="en-US" sz="1400" dirty="0"/>
+          </a:p>
+        </p:txBody>
+      </p:sp>
+    </p:spTree>
+    <p:extLst>
+      <p:ext uri="{BB962C8B-B14F-4D97-AF65-F5344CB8AC3E}">
+        <p14:creationId xmlns:p14="http://schemas.microsoft.com/office/powerpoint/2010/main" val="3075574753"/>
+      </p:ext>
+    </p:extLst>
+  </p:cSld>
+  <p:clrMapOvr>
+    <a:masterClrMapping/>
+  </p:clrMapOvr>
+</p:sld>
+</file>
+
 <file path=ppt/theme/theme1.xml><?xml version="1.0" encoding="utf-8"?>
 <a:theme xmlns:a="http://schemas.openxmlformats.org/drawingml/2006/main" name="Office Theme">
   <a:themeElements>

</xml_diff>